<commit_message>
Submitting all assessment to Vanessa and Kate
</commit_message>
<xml_diff>
--- a/TDA Presentation/TDA Presentation Slides.pptx
+++ b/TDA Presentation/TDA Presentation Slides.pptx
@@ -12,21 +12,18 @@
     <p:sldId id="260" r:id="rId6"/>
     <p:sldId id="261" r:id="rId7"/>
     <p:sldId id="271" r:id="rId8"/>
-    <p:sldId id="272" r:id="rId9"/>
-    <p:sldId id="273" r:id="rId10"/>
-    <p:sldId id="262" r:id="rId11"/>
-    <p:sldId id="263" r:id="rId12"/>
-    <p:sldId id="264" r:id="rId13"/>
-    <p:sldId id="265" r:id="rId14"/>
-    <p:sldId id="266" r:id="rId15"/>
-    <p:sldId id="267" r:id="rId16"/>
-    <p:sldId id="278" r:id="rId17"/>
-    <p:sldId id="268" r:id="rId18"/>
-    <p:sldId id="270" r:id="rId19"/>
-    <p:sldId id="275" r:id="rId20"/>
-    <p:sldId id="274" r:id="rId21"/>
-    <p:sldId id="279" r:id="rId22"/>
-    <p:sldId id="280" r:id="rId23"/>
+    <p:sldId id="273" r:id="rId9"/>
+    <p:sldId id="281" r:id="rId10"/>
+    <p:sldId id="282" r:id="rId11"/>
+    <p:sldId id="265" r:id="rId12"/>
+    <p:sldId id="266" r:id="rId13"/>
+    <p:sldId id="283" r:id="rId14"/>
+    <p:sldId id="268" r:id="rId15"/>
+    <p:sldId id="270" r:id="rId16"/>
+    <p:sldId id="275" r:id="rId17"/>
+    <p:sldId id="274" r:id="rId18"/>
+    <p:sldId id="279" r:id="rId19"/>
+    <p:sldId id="280" r:id="rId20"/>
   </p:sldIdLst>
   <p:sldSz cx="12192000" cy="6858000"/>
   <p:notesSz cx="6858000" cy="9144000"/>
@@ -359,7 +356,7 @@
           <a:p>
             <a:fld id="{D18005CF-5662-425D-ACB1-D28C3ADF91B0}" type="datetimeFigureOut">
               <a:rPr lang="en-US" smtClean="0"/>
-              <a:t>17-Feb-20</a:t>
+              <a:t>19-Feb-20</a:t>
             </a:fld>
             <a:endParaRPr lang="en-US"/>
           </a:p>
@@ -567,7 +564,7 @@
           <a:p>
             <a:fld id="{D18005CF-5662-425D-ACB1-D28C3ADF91B0}" type="datetimeFigureOut">
               <a:rPr lang="en-US" smtClean="0"/>
-              <a:t>17-Feb-20</a:t>
+              <a:t>19-Feb-20</a:t>
             </a:fld>
             <a:endParaRPr lang="en-US"/>
           </a:p>
@@ -823,7 +820,7 @@
           <a:p>
             <a:fld id="{D18005CF-5662-425D-ACB1-D28C3ADF91B0}" type="datetimeFigureOut">
               <a:rPr lang="en-US" smtClean="0"/>
-              <a:t>17-Feb-20</a:t>
+              <a:t>19-Feb-20</a:t>
             </a:fld>
             <a:endParaRPr lang="en-US"/>
           </a:p>
@@ -997,7 +994,7 @@
           <a:p>
             <a:fld id="{D18005CF-5662-425D-ACB1-D28C3ADF91B0}" type="datetimeFigureOut">
               <a:rPr lang="en-US" smtClean="0"/>
-              <a:t>17-Feb-20</a:t>
+              <a:t>19-Feb-20</a:t>
             </a:fld>
             <a:endParaRPr lang="en-US"/>
           </a:p>
@@ -1340,7 +1337,7 @@
           <a:p>
             <a:fld id="{D18005CF-5662-425D-ACB1-D28C3ADF91B0}" type="datetimeFigureOut">
               <a:rPr lang="en-US" smtClean="0"/>
-              <a:t>17-Feb-20</a:t>
+              <a:t>19-Feb-20</a:t>
             </a:fld>
             <a:endParaRPr lang="en-US"/>
           </a:p>
@@ -1615,7 +1612,7 @@
           <a:p>
             <a:fld id="{D18005CF-5662-425D-ACB1-D28C3ADF91B0}" type="datetimeFigureOut">
               <a:rPr lang="en-US" smtClean="0"/>
-              <a:t>17-Feb-20</a:t>
+              <a:t>19-Feb-20</a:t>
             </a:fld>
             <a:endParaRPr lang="en-US"/>
           </a:p>
@@ -1994,7 +1991,7 @@
           <a:p>
             <a:fld id="{D18005CF-5662-425D-ACB1-D28C3ADF91B0}" type="datetimeFigureOut">
               <a:rPr lang="en-US" smtClean="0"/>
-              <a:t>17-Feb-20</a:t>
+              <a:t>19-Feb-20</a:t>
             </a:fld>
             <a:endParaRPr lang="en-US"/>
           </a:p>
@@ -2112,7 +2109,7 @@
           <a:p>
             <a:fld id="{D18005CF-5662-425D-ACB1-D28C3ADF91B0}" type="datetimeFigureOut">
               <a:rPr lang="en-US" smtClean="0"/>
-              <a:t>17-Feb-20</a:t>
+              <a:t>19-Feb-20</a:t>
             </a:fld>
             <a:endParaRPr lang="en-US"/>
           </a:p>
@@ -2283,7 +2280,7 @@
           <a:p>
             <a:fld id="{D18005CF-5662-425D-ACB1-D28C3ADF91B0}" type="datetimeFigureOut">
               <a:rPr lang="en-US" smtClean="0"/>
-              <a:t>17-Feb-20</a:t>
+              <a:t>19-Feb-20</a:t>
             </a:fld>
             <a:endParaRPr lang="en-US"/>
           </a:p>
@@ -2637,7 +2634,7 @@
           <a:p>
             <a:fld id="{D18005CF-5662-425D-ACB1-D28C3ADF91B0}" type="datetimeFigureOut">
               <a:rPr lang="en-US" smtClean="0"/>
-              <a:t>17-Feb-20</a:t>
+              <a:t>19-Feb-20</a:t>
             </a:fld>
             <a:endParaRPr lang="en-US"/>
           </a:p>
@@ -3019,7 +3016,7 @@
           <a:p>
             <a:fld id="{D18005CF-5662-425D-ACB1-D28C3ADF91B0}" type="datetimeFigureOut">
               <a:rPr lang="en-US" smtClean="0"/>
-              <a:t>17-Feb-20</a:t>
+              <a:t>19-Feb-20</a:t>
             </a:fld>
             <a:endParaRPr lang="en-US"/>
           </a:p>
@@ -3306,7 +3303,7 @@
           <a:p>
             <a:fld id="{D18005CF-5662-425D-ACB1-D28C3ADF91B0}" type="datetimeFigureOut">
               <a:rPr lang="en-US" smtClean="0"/>
-              <a:t>17-Feb-20</a:t>
+              <a:t>19-Feb-20</a:t>
             </a:fld>
             <a:endParaRPr lang="en-US"/>
           </a:p>
@@ -3958,8 +3955,8 @@
           </a:p>
         </p:txBody>
       </p:sp>
-      <mc:AlternateContent xmlns:mc="http://schemas.openxmlformats.org/markup-compatibility/2006" xmlns:a14="http://schemas.microsoft.com/office/drawing/2010/main">
-        <mc:Choice Requires="a14">
+      <mc:AlternateContent xmlns:mc="http://schemas.openxmlformats.org/markup-compatibility/2006">
+        <mc:Choice xmlns:a14="http://schemas.microsoft.com/office/drawing/2010/main" Requires="a14">
           <p:sp>
             <p:nvSpPr>
               <p:cNvPr id="3" name="Content Placeholder 2">
@@ -3976,7 +3973,12 @@
                 <p:ph idx="1"/>
               </p:nvPr>
             </p:nvSpPr>
-            <p:spPr/>
+            <p:spPr>
+              <a:xfrm>
+                <a:off x="763481" y="1845734"/>
+                <a:ext cx="10392200" cy="4404146"/>
+              </a:xfrm>
+            </p:spPr>
             <p:txBody>
               <a:bodyPr>
                 <a:normAutofit/>
@@ -3989,204 +3991,7 @@
                 </a:pPr>
                 <a:r>
                   <a:rPr lang="en-US" dirty="0"/>
-                  <a:t> The shortest path filtration lets us associate a 1-dimensional persistence barcode to every vertex. These can be modelled as </a:t>
-                </a:r>
-                <a14:m>
-                  <m:oMath xmlns:m="http://schemas.openxmlformats.org/officeDocument/2006/math">
-                    <m:r>
-                      <a:rPr lang="en-US" b="0" i="1" smtClean="0">
-                        <a:latin typeface="Cambria Math" panose="02040503050406030204" pitchFamily="18" charset="0"/>
-                      </a:rPr>
-                      <m:t>𝑙</m:t>
-                    </m:r>
-                    <m:r>
-                      <a:rPr lang="en-US" b="0" i="1" smtClean="0">
-                        <a:latin typeface="Cambria Math" panose="02040503050406030204" pitchFamily="18" charset="0"/>
-                      </a:rPr>
-                      <m:t>×2</m:t>
-                    </m:r>
-                  </m:oMath>
-                </a14:m>
-                <a:r>
-                  <a:rPr lang="en-US" dirty="0"/>
-                  <a:t> matrices where </a:t>
-                </a:r>
-                <a14:m>
-                  <m:oMath xmlns:m="http://schemas.openxmlformats.org/officeDocument/2006/math">
-                    <m:r>
-                      <a:rPr lang="en-US" b="0" i="1" smtClean="0">
-                        <a:latin typeface="Cambria Math" panose="02040503050406030204" pitchFamily="18" charset="0"/>
-                      </a:rPr>
-                      <m:t>𝑙</m:t>
-                    </m:r>
-                  </m:oMath>
-                </a14:m>
-                <a:r>
-                  <a:rPr lang="en-US" dirty="0"/>
-                  <a:t> is the total number of </a:t>
-                </a:r>
-                <a14:m>
-                  <m:oMath xmlns:m="http://schemas.openxmlformats.org/officeDocument/2006/math">
-                    <m:r>
-                      <a:rPr lang="en-US" b="0" i="1" smtClean="0">
-                        <a:latin typeface="Cambria Math" panose="02040503050406030204" pitchFamily="18" charset="0"/>
-                      </a:rPr>
-                      <m:t>1</m:t>
-                    </m:r>
-                  </m:oMath>
-                </a14:m>
-                <a:r>
-                  <a:rPr lang="en-US" dirty="0"/>
-                  <a:t>-cycles in </a:t>
-                </a:r>
-                <a14:m>
-                  <m:oMath xmlns:m="http://schemas.openxmlformats.org/officeDocument/2006/math">
-                    <m:r>
-                      <a:rPr lang="en-US" b="0" i="1" smtClean="0">
-                        <a:latin typeface="Cambria Math" panose="02040503050406030204" pitchFamily="18" charset="0"/>
-                      </a:rPr>
-                      <m:t>𝑋</m:t>
-                    </m:r>
-                  </m:oMath>
-                </a14:m>
-                <a:r>
-                  <a:rPr lang="en-US" dirty="0"/>
-                  <a:t>.</a:t>
-                </a:r>
-              </a:p>
-            </p:txBody>
-          </p:sp>
-        </mc:Choice>
-        <mc:Fallback xmlns="">
-          <p:sp>
-            <p:nvSpPr>
-              <p:cNvPr id="3" name="Content Placeholder 2">
-                <a:extLst>
-                  <a:ext uri="{FF2B5EF4-FFF2-40B4-BE49-F238E27FC236}">
-                    <a16:creationId xmlns:a16="http://schemas.microsoft.com/office/drawing/2014/main" id="{4930F31C-7A98-4E2D-A115-949BF5EFE58B}"/>
-                  </a:ext>
-                </a:extLst>
-              </p:cNvPr>
-              <p:cNvSpPr>
-                <a:spLocks noGrp="1" noRot="1" noChangeAspect="1" noMove="1" noResize="1" noEditPoints="1" noAdjustHandles="1" noChangeArrowheads="1" noChangeShapeType="1" noTextEdit="1"/>
-              </p:cNvSpPr>
-              <p:nvPr>
-                <p:ph idx="1"/>
-              </p:nvPr>
-            </p:nvSpPr>
-            <p:spPr>
-              <a:blipFill>
-                <a:blip r:embed="rId2"/>
-                <a:stretch>
-                  <a:fillRect l="-1455" t="-1667"/>
-                </a:stretch>
-              </a:blipFill>
-            </p:spPr>
-            <p:txBody>
-              <a:bodyPr/>
-              <a:lstStyle/>
-              <a:p>
-                <a:r>
-                  <a:rPr lang="en-US">
-                    <a:noFill/>
-                  </a:rPr>
-                  <a:t> </a:t>
-                </a:r>
-              </a:p>
-            </p:txBody>
-          </p:sp>
-        </mc:Fallback>
-      </mc:AlternateContent>
-    </p:spTree>
-    <p:extLst>
-      <p:ext uri="{BB962C8B-B14F-4D97-AF65-F5344CB8AC3E}">
-        <p14:creationId xmlns:p14="http://schemas.microsoft.com/office/powerpoint/2010/main" val="765424111"/>
-      </p:ext>
-    </p:extLst>
-  </p:cSld>
-  <p:clrMapOvr>
-    <a:masterClrMapping/>
-  </p:clrMapOvr>
-</p:sld>
-</file>
-
-<file path=ppt/slides/slide11.xml><?xml version="1.0" encoding="utf-8"?>
-<p:sld xmlns:a="http://schemas.openxmlformats.org/drawingml/2006/main" xmlns:r="http://schemas.openxmlformats.org/officeDocument/2006/relationships" xmlns:p="http://schemas.openxmlformats.org/presentationml/2006/main">
-  <p:cSld>
-    <p:spTree>
-      <p:nvGrpSpPr>
-        <p:cNvPr id="1" name=""/>
-        <p:cNvGrpSpPr/>
-        <p:nvPr/>
-      </p:nvGrpSpPr>
-      <p:grpSpPr>
-        <a:xfrm>
-          <a:off x="0" y="0"/>
-          <a:ext cx="0" cy="0"/>
-          <a:chOff x="0" y="0"/>
-          <a:chExt cx="0" cy="0"/>
-        </a:xfrm>
-      </p:grpSpPr>
-      <p:sp>
-        <p:nvSpPr>
-          <p:cNvPr id="2" name="Title 1">
-            <a:extLst>
-              <a:ext uri="{FF2B5EF4-FFF2-40B4-BE49-F238E27FC236}">
-                <a16:creationId xmlns:a16="http://schemas.microsoft.com/office/drawing/2014/main" id="{7469C244-433B-45FB-B3EA-914CB98F046F}"/>
-              </a:ext>
-            </a:extLst>
-          </p:cNvPr>
-          <p:cNvSpPr>
-            <a:spLocks noGrp="1"/>
-          </p:cNvSpPr>
-          <p:nvPr>
-            <p:ph type="title"/>
-          </p:nvPr>
-        </p:nvSpPr>
-        <p:spPr/>
-        <p:txBody>
-          <a:bodyPr/>
-          <a:lstStyle/>
-          <a:p>
-            <a:r>
-              <a:rPr lang="en-US" dirty="0"/>
-              <a:t>Advantages of the Shortest Path Filtration</a:t>
-            </a:r>
-          </a:p>
-        </p:txBody>
-      </p:sp>
-      <mc:AlternateContent xmlns:mc="http://schemas.openxmlformats.org/markup-compatibility/2006" xmlns:a14="http://schemas.microsoft.com/office/drawing/2010/main">
-        <mc:Choice Requires="a14">
-          <p:sp>
-            <p:nvSpPr>
-              <p:cNvPr id="3" name="Content Placeholder 2">
-                <a:extLst>
-                  <a:ext uri="{FF2B5EF4-FFF2-40B4-BE49-F238E27FC236}">
-                    <a16:creationId xmlns:a16="http://schemas.microsoft.com/office/drawing/2014/main" id="{4930F31C-7A98-4E2D-A115-949BF5EFE58B}"/>
-                  </a:ext>
-                </a:extLst>
-              </p:cNvPr>
-              <p:cNvSpPr>
-                <a:spLocks noGrp="1"/>
-              </p:cNvSpPr>
-              <p:nvPr>
-                <p:ph idx="1"/>
-              </p:nvPr>
-            </p:nvSpPr>
-            <p:spPr/>
-            <p:txBody>
-              <a:bodyPr>
-                <a:normAutofit/>
-              </a:bodyPr>
-              <a:lstStyle/>
-              <a:p>
-                <a:pPr>
-                  <a:buFont typeface="Arial" panose="020B0604020202020204" pitchFamily="34" charset="0"/>
-                  <a:buChar char="•"/>
-                </a:pPr>
-                <a:r>
-                  <a:rPr lang="en-US" dirty="0"/>
-                  <a:t> The shortest path filtration lets us associate a 1-dimensional persistence barcode to every vertex. These can be modelled as </a:t>
+                  <a:t> Because the shortest path filtration is 1-dimensional, the 1-cycle death times will all be infinite. We can model the persistence barcodes as </a:t>
                 </a:r>
                 <a14:m>
                   <m:oMath xmlns:m="http://schemas.openxmlformats.org/officeDocument/2006/math">
@@ -4263,13 +4068,13 @@
                 <a14:m>
                   <m:oMath xmlns:m="http://schemas.openxmlformats.org/officeDocument/2006/math">
                     <m:r>
-                      <a:rPr lang="en-US" i="1" smtClean="0">
+                      <a:rPr lang="en-US" i="1">
                         <a:latin typeface="Cambria Math" panose="02040503050406030204" pitchFamily="18" charset="0"/>
                       </a:rPr>
                       <m:t>ℬ</m:t>
                     </m:r>
                     <m:r>
-                      <a:rPr lang="en-US" b="0" i="1" smtClean="0">
+                      <a:rPr lang="en-US" i="1">
                         <a:latin typeface="Cambria Math" panose="02040503050406030204" pitchFamily="18" charset="0"/>
                       </a:rPr>
                       <m:t>=</m:t>
@@ -4279,383 +4084,7 @@
                         <m:begChr m:val="["/>
                         <m:endChr m:val="]"/>
                         <m:ctrlPr>
-                          <a:rPr lang="en-US" i="1" smtClean="0">
-                            <a:latin typeface="Cambria Math" panose="02040503050406030204" pitchFamily="18" charset="0"/>
-                          </a:rPr>
-                        </m:ctrlPr>
-                      </m:dPr>
-                      <m:e>
-                        <m:m>
-                          <m:mPr>
-                            <m:mcs>
-                              <m:mc>
-                                <m:mcPr>
-                                  <m:count m:val="2"/>
-                                  <m:mcJc m:val="center"/>
-                                </m:mcPr>
-                              </m:mc>
-                            </m:mcs>
-                            <m:ctrlPr>
-                              <a:rPr lang="en-US" i="1">
-                                <a:latin typeface="Cambria Math" panose="02040503050406030204" pitchFamily="18" charset="0"/>
-                              </a:rPr>
-                            </m:ctrlPr>
-                          </m:mPr>
-                          <m:mr>
-                            <m:e>
-                              <m:r>
-                                <a:rPr lang="en-US" i="1">
-                                  <a:latin typeface="Cambria Math" panose="02040503050406030204" pitchFamily="18" charset="0"/>
-                                </a:rPr>
-                                <m:t>4</m:t>
-                              </m:r>
-                            </m:e>
-                            <m:e>
-                              <m:r>
-                                <a:rPr lang="en-US" i="1">
-                                  <a:latin typeface="Cambria Math" panose="02040503050406030204" pitchFamily="18" charset="0"/>
-                                </a:rPr>
-                                <m:t>∞</m:t>
-                              </m:r>
-                            </m:e>
-                          </m:mr>
-                          <m:mr>
-                            <m:e>
-                              <m:r>
-                                <a:rPr lang="en-US" i="1">
-                                  <a:latin typeface="Cambria Math" panose="02040503050406030204" pitchFamily="18" charset="0"/>
-                                </a:rPr>
-                                <m:t>4</m:t>
-                              </m:r>
-                            </m:e>
-                            <m:e>
-                              <m:r>
-                                <a:rPr lang="en-US" i="1">
-                                  <a:latin typeface="Cambria Math" panose="02040503050406030204" pitchFamily="18" charset="0"/>
-                                </a:rPr>
-                                <m:t>∞</m:t>
-                              </m:r>
-                            </m:e>
-                          </m:mr>
-                          <m:mr>
-                            <m:e>
-                              <m:r>
-                                <a:rPr lang="en-US" i="1">
-                                  <a:latin typeface="Cambria Math" panose="02040503050406030204" pitchFamily="18" charset="0"/>
-                                </a:rPr>
-                                <m:t>3</m:t>
-                              </m:r>
-                            </m:e>
-                            <m:e>
-                              <m:r>
-                                <a:rPr lang="en-US" i="1">
-                                  <a:latin typeface="Cambria Math" panose="02040503050406030204" pitchFamily="18" charset="0"/>
-                                </a:rPr>
-                                <m:t>∞</m:t>
-                              </m:r>
-                            </m:e>
-                          </m:mr>
-                          <m:mr>
-                            <m:e>
-                              <m:r>
-                                <a:rPr lang="en-US" i="1">
-                                  <a:latin typeface="Cambria Math" panose="02040503050406030204" pitchFamily="18" charset="0"/>
-                                </a:rPr>
-                                <m:t>2</m:t>
-                              </m:r>
-                            </m:e>
-                            <m:e>
-                              <m:r>
-                                <a:rPr lang="en-US" i="1">
-                                  <a:latin typeface="Cambria Math" panose="02040503050406030204" pitchFamily="18" charset="0"/>
-                                </a:rPr>
-                                <m:t>∞</m:t>
-                              </m:r>
-                            </m:e>
-                          </m:mr>
-                          <m:mr>
-                            <m:e>
-                              <m:r>
-                                <a:rPr lang="en-US" i="1">
-                                  <a:latin typeface="Cambria Math" panose="02040503050406030204" pitchFamily="18" charset="0"/>
-                                </a:rPr>
-                                <m:t>1</m:t>
-                              </m:r>
-                            </m:e>
-                            <m:e>
-                              <m:r>
-                                <a:rPr lang="en-US" i="1">
-                                  <a:latin typeface="Cambria Math" panose="02040503050406030204" pitchFamily="18" charset="0"/>
-                                </a:rPr>
-                                <m:t>∞</m:t>
-                              </m:r>
-                            </m:e>
-                          </m:mr>
-                          <m:mr>
-                            <m:e>
-                              <m:r>
-                                <a:rPr lang="en-US" i="1">
-                                  <a:latin typeface="Cambria Math" panose="02040503050406030204" pitchFamily="18" charset="0"/>
-                                </a:rPr>
-                                <m:t>1</m:t>
-                              </m:r>
-                            </m:e>
-                            <m:e>
-                              <m:r>
-                                <a:rPr lang="en-US" i="1">
-                                  <a:latin typeface="Cambria Math" panose="02040503050406030204" pitchFamily="18" charset="0"/>
-                                </a:rPr>
-                                <m:t>∞</m:t>
-                              </m:r>
-                            </m:e>
-                          </m:mr>
-                        </m:m>
-                      </m:e>
-                    </m:d>
-                  </m:oMath>
-                </a14:m>
-                <a:r>
-                  <a:rPr lang="en-US" dirty="0"/>
-                  <a:t>. </a:t>
-                </a:r>
-              </a:p>
-              <a:p>
-                <a:pPr marL="0" indent="0">
-                  <a:buNone/>
-                </a:pPr>
-                <a:endParaRPr lang="en-US" dirty="0"/>
-              </a:p>
-            </p:txBody>
-          </p:sp>
-        </mc:Choice>
-        <mc:Fallback xmlns="">
-          <p:sp>
-            <p:nvSpPr>
-              <p:cNvPr id="3" name="Content Placeholder 2">
-                <a:extLst>
-                  <a:ext uri="{FF2B5EF4-FFF2-40B4-BE49-F238E27FC236}">
-                    <a16:creationId xmlns:a16="http://schemas.microsoft.com/office/drawing/2014/main" id="{4930F31C-7A98-4E2D-A115-949BF5EFE58B}"/>
-                  </a:ext>
-                </a:extLst>
-              </p:cNvPr>
-              <p:cNvSpPr>
-                <a:spLocks noGrp="1" noRot="1" noChangeAspect="1" noMove="1" noResize="1" noEditPoints="1" noAdjustHandles="1" noChangeArrowheads="1" noChangeShapeType="1" noTextEdit="1"/>
-              </p:cNvSpPr>
-              <p:nvPr>
-                <p:ph idx="1"/>
-              </p:nvPr>
-            </p:nvSpPr>
-            <p:spPr>
-              <a:blipFill>
-                <a:blip r:embed="rId2"/>
-                <a:stretch>
-                  <a:fillRect l="-1455" t="-1667"/>
-                </a:stretch>
-              </a:blipFill>
-            </p:spPr>
-            <p:txBody>
-              <a:bodyPr/>
-              <a:lstStyle/>
-              <a:p>
-                <a:r>
-                  <a:rPr lang="en-US">
-                    <a:noFill/>
-                  </a:rPr>
-                  <a:t> </a:t>
-                </a:r>
-              </a:p>
-            </p:txBody>
-          </p:sp>
-        </mc:Fallback>
-      </mc:AlternateContent>
-    </p:spTree>
-    <p:extLst>
-      <p:ext uri="{BB962C8B-B14F-4D97-AF65-F5344CB8AC3E}">
-        <p14:creationId xmlns:p14="http://schemas.microsoft.com/office/powerpoint/2010/main" val="1229688435"/>
-      </p:ext>
-    </p:extLst>
-  </p:cSld>
-  <p:clrMapOvr>
-    <a:masterClrMapping/>
-  </p:clrMapOvr>
-</p:sld>
-</file>
-
-<file path=ppt/slides/slide12.xml><?xml version="1.0" encoding="utf-8"?>
-<p:sld xmlns:a="http://schemas.openxmlformats.org/drawingml/2006/main" xmlns:r="http://schemas.openxmlformats.org/officeDocument/2006/relationships" xmlns:p="http://schemas.openxmlformats.org/presentationml/2006/main">
-  <p:cSld>
-    <p:spTree>
-      <p:nvGrpSpPr>
-        <p:cNvPr id="1" name=""/>
-        <p:cNvGrpSpPr/>
-        <p:nvPr/>
-      </p:nvGrpSpPr>
-      <p:grpSpPr>
-        <a:xfrm>
-          <a:off x="0" y="0"/>
-          <a:ext cx="0" cy="0"/>
-          <a:chOff x="0" y="0"/>
-          <a:chExt cx="0" cy="0"/>
-        </a:xfrm>
-      </p:grpSpPr>
-      <p:sp>
-        <p:nvSpPr>
-          <p:cNvPr id="2" name="Title 1">
-            <a:extLst>
-              <a:ext uri="{FF2B5EF4-FFF2-40B4-BE49-F238E27FC236}">
-                <a16:creationId xmlns:a16="http://schemas.microsoft.com/office/drawing/2014/main" id="{7469C244-433B-45FB-B3EA-914CB98F046F}"/>
-              </a:ext>
-            </a:extLst>
-          </p:cNvPr>
-          <p:cNvSpPr>
-            <a:spLocks noGrp="1"/>
-          </p:cNvSpPr>
-          <p:nvPr>
-            <p:ph type="title"/>
-          </p:nvPr>
-        </p:nvSpPr>
-        <p:spPr/>
-        <p:txBody>
-          <a:bodyPr/>
-          <a:lstStyle/>
-          <a:p>
-            <a:r>
-              <a:rPr lang="en-US" dirty="0"/>
-              <a:t>Advantages of the Shortest Path Filtration</a:t>
-            </a:r>
-          </a:p>
-        </p:txBody>
-      </p:sp>
-      <mc:AlternateContent xmlns:mc="http://schemas.openxmlformats.org/markup-compatibility/2006">
-        <mc:Choice xmlns:a14="http://schemas.microsoft.com/office/drawing/2010/main" Requires="a14">
-          <p:sp>
-            <p:nvSpPr>
-              <p:cNvPr id="3" name="Content Placeholder 2">
-                <a:extLst>
-                  <a:ext uri="{FF2B5EF4-FFF2-40B4-BE49-F238E27FC236}">
-                    <a16:creationId xmlns:a16="http://schemas.microsoft.com/office/drawing/2014/main" id="{4930F31C-7A98-4E2D-A115-949BF5EFE58B}"/>
-                  </a:ext>
-                </a:extLst>
-              </p:cNvPr>
-              <p:cNvSpPr>
-                <a:spLocks noGrp="1"/>
-              </p:cNvSpPr>
-              <p:nvPr>
-                <p:ph idx="1"/>
-              </p:nvPr>
-            </p:nvSpPr>
-            <p:spPr>
-              <a:xfrm>
-                <a:off x="1097280" y="1845734"/>
-                <a:ext cx="10058400" cy="4244348"/>
-              </a:xfrm>
-            </p:spPr>
-            <p:txBody>
-              <a:bodyPr>
-                <a:normAutofit/>
-              </a:bodyPr>
-              <a:lstStyle/>
-              <a:p>
-                <a:pPr>
-                  <a:buFont typeface="Arial" panose="020B0604020202020204" pitchFamily="34" charset="0"/>
-                  <a:buChar char="•"/>
-                </a:pPr>
-                <a:r>
-                  <a:rPr lang="en-US" dirty="0"/>
-                  <a:t> The shortest path filtration lets us associate a 1-dimensional persistence barcode to every vertex. These can be modelled as </a:t>
-                </a:r>
-                <a14:m>
-                  <m:oMath xmlns:m="http://schemas.openxmlformats.org/officeDocument/2006/math">
-                    <m:r>
-                      <a:rPr lang="en-US" b="0" i="1" smtClean="0">
-                        <a:latin typeface="Cambria Math" panose="02040503050406030204" pitchFamily="18" charset="0"/>
-                      </a:rPr>
-                      <m:t>𝑙</m:t>
-                    </m:r>
-                    <m:r>
-                      <a:rPr lang="en-US" b="0" i="1" smtClean="0">
-                        <a:latin typeface="Cambria Math" panose="02040503050406030204" pitchFamily="18" charset="0"/>
-                      </a:rPr>
-                      <m:t>×2</m:t>
-                    </m:r>
-                  </m:oMath>
-                </a14:m>
-                <a:r>
-                  <a:rPr lang="en-US" dirty="0"/>
-                  <a:t> matrices where </a:t>
-                </a:r>
-                <a14:m>
-                  <m:oMath xmlns:m="http://schemas.openxmlformats.org/officeDocument/2006/math">
-                    <m:r>
-                      <a:rPr lang="en-US" b="0" i="1" smtClean="0">
-                        <a:latin typeface="Cambria Math" panose="02040503050406030204" pitchFamily="18" charset="0"/>
-                      </a:rPr>
-                      <m:t>𝑙</m:t>
-                    </m:r>
-                  </m:oMath>
-                </a14:m>
-                <a:r>
-                  <a:rPr lang="en-US" dirty="0"/>
-                  <a:t> is the total number of </a:t>
-                </a:r>
-                <a14:m>
-                  <m:oMath xmlns:m="http://schemas.openxmlformats.org/officeDocument/2006/math">
-                    <m:r>
-                      <a:rPr lang="en-US" b="0" i="1" smtClean="0">
-                        <a:latin typeface="Cambria Math" panose="02040503050406030204" pitchFamily="18" charset="0"/>
-                      </a:rPr>
-                      <m:t>1</m:t>
-                    </m:r>
-                  </m:oMath>
-                </a14:m>
-                <a:r>
-                  <a:rPr lang="en-US" dirty="0"/>
-                  <a:t>-cycles in </a:t>
-                </a:r>
-                <a14:m>
-                  <m:oMath xmlns:m="http://schemas.openxmlformats.org/officeDocument/2006/math">
-                    <m:r>
-                      <a:rPr lang="en-US" b="0" i="1" smtClean="0">
-                        <a:latin typeface="Cambria Math" panose="02040503050406030204" pitchFamily="18" charset="0"/>
-                      </a:rPr>
-                      <m:t>𝑋</m:t>
-                    </m:r>
-                  </m:oMath>
-                </a14:m>
-                <a:r>
-                  <a:rPr lang="en-US" dirty="0"/>
-                  <a:t>.</a:t>
-                </a:r>
-              </a:p>
-              <a:p>
-                <a:pPr>
-                  <a:buFont typeface="Arial" panose="020B0604020202020204" pitchFamily="34" charset="0"/>
-                  <a:buChar char="•"/>
-                </a:pPr>
-                <a:r>
-                  <a:rPr lang="en-US" dirty="0"/>
-                  <a:t> Our algorithm naturally generates sorted barcodes e.g. </a:t>
-                </a:r>
-                <a14:m>
-                  <m:oMath xmlns:m="http://schemas.openxmlformats.org/officeDocument/2006/math">
-                    <m:r>
-                      <a:rPr lang="en-US" i="1" smtClean="0">
-                        <a:latin typeface="Cambria Math" panose="02040503050406030204" pitchFamily="18" charset="0"/>
-                      </a:rPr>
-                      <m:t>ℬ</m:t>
-                    </m:r>
-                    <m:r>
-                      <a:rPr lang="en-US" b="0" i="1" smtClean="0">
-                        <a:latin typeface="Cambria Math" panose="02040503050406030204" pitchFamily="18" charset="0"/>
-                      </a:rPr>
-                      <m:t>=</m:t>
-                    </m:r>
-                    <m:d>
-                      <m:dPr>
-                        <m:begChr m:val="["/>
-                        <m:endChr m:val="]"/>
-                        <m:ctrlPr>
-                          <a:rPr lang="en-US" i="1" smtClean="0">
+                          <a:rPr lang="en-US" i="1">
                             <a:latin typeface="Cambria Math" panose="02040503050406030204" pitchFamily="18" charset="0"/>
                           </a:rPr>
                         </m:ctrlPr>
@@ -4850,14 +4279,14 @@
                       <m:sSub>
                         <m:sSubPr>
                           <m:ctrlPr>
-                            <a:rPr lang="en-US" b="0" i="1" smtClean="0">
+                            <a:rPr lang="en-US" i="1">
                               <a:latin typeface="Cambria Math" panose="02040503050406030204" pitchFamily="18" charset="0"/>
                             </a:rPr>
                           </m:ctrlPr>
                         </m:sSubPr>
                         <m:e>
                           <m:r>
-                            <a:rPr lang="en-US" b="0" i="1" smtClean="0">
+                            <a:rPr lang="en-US" i="1">
                               <a:latin typeface="Cambria Math" panose="02040503050406030204" pitchFamily="18" charset="0"/>
                             </a:rPr>
                             <m:t>𝑊</m:t>
@@ -4865,7 +4294,7 @@
                         </m:e>
                         <m:sub>
                           <m:r>
-                            <a:rPr lang="en-US" b="0" i="1" smtClean="0">
+                            <a:rPr lang="en-US" i="1">
                               <a:latin typeface="Cambria Math" panose="02040503050406030204" pitchFamily="18" charset="0"/>
                             </a:rPr>
                             <m:t>2,2</m:t>
@@ -4875,7 +4304,7 @@
                       <m:d>
                         <m:dPr>
                           <m:ctrlPr>
-                            <a:rPr lang="en-US" b="0" i="1" smtClean="0">
+                            <a:rPr lang="en-US" i="1">
                               <a:latin typeface="Cambria Math" panose="02040503050406030204" pitchFamily="18" charset="0"/>
                             </a:rPr>
                           </m:ctrlPr>
@@ -4884,7 +4313,7 @@
                           <m:sSup>
                             <m:sSupPr>
                               <m:ctrlPr>
-                                <a:rPr lang="en-US" b="0" i="1" smtClean="0">
+                                <a:rPr lang="en-US" i="1">
                                   <a:latin typeface="Cambria Math" panose="02040503050406030204" pitchFamily="18" charset="0"/>
                                 </a:rPr>
                               </m:ctrlPr>
@@ -4899,7 +4328,7 @@
                             </m:e>
                             <m:sup>
                               <m:r>
-                                <a:rPr lang="en-US" b="0" i="1" smtClean="0">
+                                <a:rPr lang="en-US" i="1">
                                   <a:latin typeface="Cambria Math" panose="02040503050406030204" pitchFamily="18" charset="0"/>
                                 </a:rPr>
                                 <m:t>1</m:t>
@@ -4907,7 +4336,7 @@
                             </m:sup>
                           </m:sSup>
                           <m:r>
-                            <a:rPr lang="en-US" b="0" i="1" smtClean="0">
+                            <a:rPr lang="en-US" i="1">
                               <a:latin typeface="Cambria Math" panose="02040503050406030204" pitchFamily="18" charset="0"/>
                             </a:rPr>
                             <m:t>,</m:t>
@@ -4915,7 +4344,7 @@
                           <m:sSup>
                             <m:sSupPr>
                               <m:ctrlPr>
-                                <a:rPr lang="en-US" b="0" i="1" smtClean="0">
+                                <a:rPr lang="en-US" i="1">
                                   <a:latin typeface="Cambria Math" panose="02040503050406030204" pitchFamily="18" charset="0"/>
                                 </a:rPr>
                               </m:ctrlPr>
@@ -4930,7 +4359,7 @@
                             </m:e>
                             <m:sup>
                               <m:r>
-                                <a:rPr lang="en-US" b="0" i="1" smtClean="0">
+                                <a:rPr lang="en-US" i="1">
                                   <a:latin typeface="Cambria Math" panose="02040503050406030204" pitchFamily="18" charset="0"/>
                                 </a:rPr>
                                 <m:t>2</m:t>
@@ -4940,7 +4369,7 @@
                         </m:e>
                       </m:d>
                       <m:r>
-                        <a:rPr lang="en-US" b="0" i="1" smtClean="0">
+                        <a:rPr lang="en-US" i="1">
                           <a:latin typeface="Cambria Math" panose="02040503050406030204" pitchFamily="18" charset="0"/>
                         </a:rPr>
                         <m:t>=</m:t>
@@ -4949,7 +4378,7 @@
                         <m:radPr>
                           <m:degHide m:val="on"/>
                           <m:ctrlPr>
-                            <a:rPr lang="en-US" b="0" i="1" smtClean="0">
+                            <a:rPr lang="en-US" i="1">
                               <a:latin typeface="Cambria Math" panose="02040503050406030204" pitchFamily="18" charset="0"/>
                             </a:rPr>
                           </m:ctrlPr>
@@ -4960,7 +4389,7 @@
                             <m:naryPr>
                               <m:chr m:val="∑"/>
                               <m:ctrlPr>
-                                <a:rPr lang="en-US" b="0" i="1" smtClean="0">
+                                <a:rPr lang="en-US" i="1">
                                   <a:latin typeface="Cambria Math" panose="02040503050406030204" pitchFamily="18" charset="0"/>
                                 </a:rPr>
                               </m:ctrlPr>
@@ -4970,13 +4399,13 @@
                                 <m:rPr>
                                   <m:brk m:alnAt="23"/>
                                 </m:rPr>
-                                <a:rPr lang="en-US" b="0" i="1" smtClean="0">
+                                <a:rPr lang="en-US" i="1">
                                   <a:latin typeface="Cambria Math" panose="02040503050406030204" pitchFamily="18" charset="0"/>
                                 </a:rPr>
                                 <m:t>𝑘</m:t>
                               </m:r>
                               <m:r>
-                                <a:rPr lang="en-US" b="0" i="1" smtClean="0">
+                                <a:rPr lang="en-US" i="1">
                                   <a:latin typeface="Cambria Math" panose="02040503050406030204" pitchFamily="18" charset="0"/>
                                 </a:rPr>
                                 <m:t>=1</m:t>
@@ -4984,7 +4413,7 @@
                             </m:sub>
                             <m:sup>
                               <m:r>
-                                <a:rPr lang="en-US" b="0" i="1" smtClean="0">
+                                <a:rPr lang="en-US" i="1">
                                   <a:latin typeface="Cambria Math" panose="02040503050406030204" pitchFamily="18" charset="0"/>
                                 </a:rPr>
                                 <m:t>𝑙</m:t>
@@ -4994,7 +4423,7 @@
                               <m:sSup>
                                 <m:sSupPr>
                                   <m:ctrlPr>
-                                    <a:rPr lang="en-US" b="0" i="1" smtClean="0">
+                                    <a:rPr lang="en-US" i="1">
                                       <a:latin typeface="Cambria Math" panose="02040503050406030204" pitchFamily="18" charset="0"/>
                                     </a:rPr>
                                   </m:ctrlPr>
@@ -5005,7 +4434,7 @@
                                       <m:begChr m:val="|"/>
                                       <m:endChr m:val="|"/>
                                       <m:ctrlPr>
-                                        <a:rPr lang="en-US" b="0" i="1" smtClean="0">
+                                        <a:rPr lang="en-US" i="1">
                                           <a:latin typeface="Cambria Math" panose="02040503050406030204" pitchFamily="18" charset="0"/>
                                         </a:rPr>
                                       </m:ctrlPr>
@@ -5014,7 +4443,7 @@
                                       <m:sSubSup>
                                         <m:sSubSupPr>
                                           <m:ctrlPr>
-                                            <a:rPr lang="en-US" b="0" i="1" smtClean="0">
+                                            <a:rPr lang="en-US" i="1">
                                               <a:latin typeface="Cambria Math" panose="02040503050406030204" pitchFamily="18" charset="0"/>
                                             </a:rPr>
                                           </m:ctrlPr>
@@ -5029,13 +4458,13 @@
                                         </m:e>
                                         <m:sub>
                                           <m:r>
-                                            <a:rPr lang="en-US" b="0" i="1" smtClean="0">
+                                            <a:rPr lang="en-US" i="1">
                                               <a:latin typeface="Cambria Math" panose="02040503050406030204" pitchFamily="18" charset="0"/>
                                             </a:rPr>
                                             <m:t>𝑘</m:t>
                                           </m:r>
                                           <m:r>
-                                            <a:rPr lang="en-US" b="0" i="1" smtClean="0">
+                                            <a:rPr lang="en-US" i="1">
                                               <a:latin typeface="Cambria Math" panose="02040503050406030204" pitchFamily="18" charset="0"/>
                                             </a:rPr>
                                             <m:t>,1</m:t>
@@ -5043,7 +4472,7 @@
                                         </m:sub>
                                         <m:sup>
                                           <m:r>
-                                            <a:rPr lang="en-US" b="0" i="1" smtClean="0">
+                                            <a:rPr lang="en-US" i="1">
                                               <a:latin typeface="Cambria Math" panose="02040503050406030204" pitchFamily="18" charset="0"/>
                                             </a:rPr>
                                             <m:t>1</m:t>
@@ -5051,7 +4480,7 @@
                                         </m:sup>
                                       </m:sSubSup>
                                       <m:r>
-                                        <a:rPr lang="en-US" b="0" i="1" smtClean="0">
+                                        <a:rPr lang="en-US" i="1">
                                           <a:latin typeface="Cambria Math" panose="02040503050406030204" pitchFamily="18" charset="0"/>
                                         </a:rPr>
                                         <m:t>−</m:t>
@@ -5059,7 +4488,7 @@
                                       <m:sSubSup>
                                         <m:sSubSupPr>
                                           <m:ctrlPr>
-                                            <a:rPr lang="en-US" b="0" i="1" smtClean="0">
+                                            <a:rPr lang="en-US" i="1">
                                               <a:latin typeface="Cambria Math" panose="02040503050406030204" pitchFamily="18" charset="0"/>
                                             </a:rPr>
                                           </m:ctrlPr>
@@ -5074,13 +4503,13 @@
                                         </m:e>
                                         <m:sub>
                                           <m:r>
-                                            <a:rPr lang="en-US" b="0" i="1" smtClean="0">
+                                            <a:rPr lang="en-US" i="1">
                                               <a:latin typeface="Cambria Math" panose="02040503050406030204" pitchFamily="18" charset="0"/>
                                             </a:rPr>
                                             <m:t>𝑘</m:t>
                                           </m:r>
                                           <m:r>
-                                            <a:rPr lang="en-US" b="0" i="1" smtClean="0">
+                                            <a:rPr lang="en-US" i="1">
                                               <a:latin typeface="Cambria Math" panose="02040503050406030204" pitchFamily="18" charset="0"/>
                                             </a:rPr>
                                             <m:t>,1</m:t>
@@ -5088,7 +4517,7 @@
                                         </m:sub>
                                         <m:sup>
                                           <m:r>
-                                            <a:rPr lang="en-US" b="0" i="1" smtClean="0">
+                                            <a:rPr lang="en-US" i="1">
                                               <a:latin typeface="Cambria Math" panose="02040503050406030204" pitchFamily="18" charset="0"/>
                                             </a:rPr>
                                             <m:t>2</m:t>
@@ -5100,7 +4529,7 @@
                                 </m:e>
                                 <m:sup>
                                   <m:r>
-                                    <a:rPr lang="en-US" b="0" i="1" smtClean="0">
+                                    <a:rPr lang="en-US" i="1">
                                       <a:latin typeface="Cambria Math" panose="02040503050406030204" pitchFamily="18" charset="0"/>
                                     </a:rPr>
                                     <m:t>2</m:t>
@@ -5114,6 +4543,19 @@
                     </m:oMath>
                   </m:oMathPara>
                 </a14:m>
+                <a:endParaRPr lang="en-US" dirty="0"/>
+              </a:p>
+              <a:p>
+                <a:pPr marL="0" indent="0">
+                  <a:buNone/>
+                </a:pPr>
+                <a:endParaRPr lang="en-US" dirty="0"/>
+              </a:p>
+              <a:p>
+                <a:pPr>
+                  <a:buFont typeface="Arial" panose="020B0604020202020204" pitchFamily="34" charset="0"/>
+                  <a:buChar char="•"/>
+                </a:pPr>
                 <a:endParaRPr lang="en-US" dirty="0"/>
               </a:p>
             </p:txBody>
@@ -5138,13 +4580,13 @@
             </p:nvSpPr>
             <p:spPr>
               <a:xfrm>
-                <a:off x="1097280" y="1845734"/>
-                <a:ext cx="10058400" cy="4244348"/>
+                <a:off x="763481" y="1845734"/>
+                <a:ext cx="10392200" cy="4404146"/>
               </a:xfrm>
               <a:blipFill>
                 <a:blip r:embed="rId2"/>
                 <a:stretch>
-                  <a:fillRect l="-1455" t="-1580"/>
+                  <a:fillRect l="-1408" t="-1524" r="-1584"/>
                 </a:stretch>
               </a:blipFill>
             </p:spPr>
@@ -5166,7 +4608,7 @@
     </p:spTree>
     <p:extLst>
       <p:ext uri="{BB962C8B-B14F-4D97-AF65-F5344CB8AC3E}">
-        <p14:creationId xmlns:p14="http://schemas.microsoft.com/office/powerpoint/2010/main" val="3894166212"/>
+        <p14:creationId xmlns:p14="http://schemas.microsoft.com/office/powerpoint/2010/main" val="3732321773"/>
       </p:ext>
     </p:extLst>
   </p:cSld>
@@ -5176,7 +4618,7 @@
 </p:sld>
 </file>
 
-<file path=ppt/slides/slide13.xml><?xml version="1.0" encoding="utf-8"?>
+<file path=ppt/slides/slide11.xml><?xml version="1.0" encoding="utf-8"?>
 <p:sld xmlns:a="http://schemas.openxmlformats.org/drawingml/2006/main" xmlns:r="http://schemas.openxmlformats.org/officeDocument/2006/relationships" xmlns:p="http://schemas.openxmlformats.org/presentationml/2006/main">
   <p:cSld>
     <p:spTree>
@@ -5343,7 +4785,7 @@
 </p:sld>
 </file>
 
-<file path=ppt/slides/slide14.xml><?xml version="1.0" encoding="utf-8"?>
+<file path=ppt/slides/slide12.xml><?xml version="1.0" encoding="utf-8"?>
 <p:sld xmlns:a="http://schemas.openxmlformats.org/drawingml/2006/main" xmlns:r="http://schemas.openxmlformats.org/officeDocument/2006/relationships" xmlns:p="http://schemas.openxmlformats.org/presentationml/2006/main">
   <p:cSld>
     <p:spTree>
@@ -5528,7 +4970,7 @@
 </p:sld>
 </file>
 
-<file path=ppt/slides/slide15.xml><?xml version="1.0" encoding="utf-8"?>
+<file path=ppt/slides/slide13.xml><?xml version="1.0" encoding="utf-8"?>
 <p:sld xmlns:a="http://schemas.openxmlformats.org/drawingml/2006/main" xmlns:r="http://schemas.openxmlformats.org/officeDocument/2006/relationships" xmlns:p="http://schemas.openxmlformats.org/presentationml/2006/main">
   <p:cSld>
     <p:spTree>
@@ -5550,197 +4992,6 @@
           <p:cNvPr id="2" name="Title 1">
             <a:extLst>
               <a:ext uri="{FF2B5EF4-FFF2-40B4-BE49-F238E27FC236}">
-                <a16:creationId xmlns:a16="http://schemas.microsoft.com/office/drawing/2014/main" id="{9BD161D0-766F-4BA8-A5ED-9C3F898B2D1C}"/>
-              </a:ext>
-            </a:extLst>
-          </p:cNvPr>
-          <p:cNvSpPr>
-            <a:spLocks noGrp="1"/>
-          </p:cNvSpPr>
-          <p:nvPr>
-            <p:ph type="title"/>
-          </p:nvPr>
-        </p:nvSpPr>
-        <p:spPr/>
-        <p:txBody>
-          <a:bodyPr/>
-          <a:lstStyle/>
-          <a:p>
-            <a:r>
-              <a:rPr lang="en-US" dirty="0"/>
-              <a:t>Refining the Search</a:t>
-            </a:r>
-          </a:p>
-        </p:txBody>
-      </p:sp>
-      <p:sp>
-        <p:nvSpPr>
-          <p:cNvPr id="3" name="Content Placeholder 2">
-            <a:extLst>
-              <a:ext uri="{FF2B5EF4-FFF2-40B4-BE49-F238E27FC236}">
-                <a16:creationId xmlns:a16="http://schemas.microsoft.com/office/drawing/2014/main" id="{E86AB067-CAC4-4942-B915-6DB9B3809AD8}"/>
-              </a:ext>
-            </a:extLst>
-          </p:cNvPr>
-          <p:cNvSpPr>
-            <a:spLocks noGrp="1"/>
-          </p:cNvSpPr>
-          <p:nvPr>
-            <p:ph idx="1"/>
-          </p:nvPr>
-        </p:nvSpPr>
-        <p:spPr>
-          <a:xfrm>
-            <a:off x="1097280" y="1845734"/>
-            <a:ext cx="6589395" cy="4023360"/>
-          </a:xfrm>
-        </p:spPr>
-        <p:txBody>
-          <a:bodyPr/>
-          <a:lstStyle/>
-          <a:p>
-            <a:pPr>
-              <a:buFont typeface="Arial" panose="020B0604020202020204" pitchFamily="34" charset="0"/>
-              <a:buChar char="•"/>
-            </a:pPr>
-            <a:r>
-              <a:rPr lang="en-US" dirty="0"/>
-              <a:t> Figure 2 is an example graph generated using more classical clustering methods.</a:t>
-            </a:r>
-          </a:p>
-          <a:p>
-            <a:pPr>
-              <a:buFont typeface="Arial" panose="020B0604020202020204" pitchFamily="34" charset="0"/>
-              <a:buChar char="•"/>
-            </a:pPr>
-            <a:r>
-              <a:rPr lang="en-US" dirty="0"/>
-              <a:t> Using the Wasserstein distance, the vertices in the upper right-hand corner can be said to be “close enough” to </a:t>
-            </a:r>
-            <a:r>
-              <a:rPr lang="en-US" dirty="0" err="1"/>
-              <a:t>neighbouring</a:t>
-            </a:r>
-            <a:r>
-              <a:rPr lang="en-US" dirty="0"/>
-              <a:t> cluster points to also be part of the cluster.</a:t>
-            </a:r>
-          </a:p>
-          <a:p>
-            <a:pPr marL="0" indent="0">
-              <a:buNone/>
-            </a:pPr>
-            <a:endParaRPr lang="en-US" dirty="0"/>
-          </a:p>
-        </p:txBody>
-      </p:sp>
-      <p:pic>
-        <p:nvPicPr>
-          <p:cNvPr id="5" name="Picture 4" descr="A picture containing game, necklace&#10;&#10;Description automatically generated">
-            <a:extLst>
-              <a:ext uri="{FF2B5EF4-FFF2-40B4-BE49-F238E27FC236}">
-                <a16:creationId xmlns:a16="http://schemas.microsoft.com/office/drawing/2014/main" id="{6016A057-368C-42F4-BC69-E2BB79D5443B}"/>
-              </a:ext>
-            </a:extLst>
-          </p:cNvPr>
-          <p:cNvPicPr>
-            <a:picLocks noChangeAspect="1"/>
-          </p:cNvPicPr>
-          <p:nvPr/>
-        </p:nvPicPr>
-        <p:blipFill>
-          <a:blip r:embed="rId2">
-            <a:extLst>
-              <a:ext uri="{28A0092B-C50C-407E-A947-70E740481C1C}">
-                <a14:useLocalDpi xmlns:a14="http://schemas.microsoft.com/office/drawing/2010/main" val="0"/>
-              </a:ext>
-            </a:extLst>
-          </a:blip>
-          <a:stretch>
-            <a:fillRect/>
-          </a:stretch>
-        </p:blipFill>
-        <p:spPr>
-          <a:xfrm>
-            <a:off x="7771798" y="1833041"/>
-            <a:ext cx="4105275" cy="2914650"/>
-          </a:xfrm>
-          <a:prstGeom prst="rect">
-            <a:avLst/>
-          </a:prstGeom>
-        </p:spPr>
-      </p:pic>
-      <p:sp>
-        <p:nvSpPr>
-          <p:cNvPr id="6" name="TextBox 5">
-            <a:extLst>
-              <a:ext uri="{FF2B5EF4-FFF2-40B4-BE49-F238E27FC236}">
-                <a16:creationId xmlns:a16="http://schemas.microsoft.com/office/drawing/2014/main" id="{72ED4774-03C8-4691-ACF0-3C2C2FC556D0}"/>
-              </a:ext>
-            </a:extLst>
-          </p:cNvPr>
-          <p:cNvSpPr txBox="1"/>
-          <p:nvPr/>
-        </p:nvSpPr>
-        <p:spPr>
-          <a:xfrm>
-            <a:off x="7977233" y="4736951"/>
-            <a:ext cx="3694404" cy="646331"/>
-          </a:xfrm>
-          <a:prstGeom prst="rect">
-            <a:avLst/>
-          </a:prstGeom>
-          <a:noFill/>
-        </p:spPr>
-        <p:txBody>
-          <a:bodyPr wrap="square" rtlCol="0">
-            <a:spAutoFit/>
-          </a:bodyPr>
-          <a:lstStyle/>
-          <a:p>
-            <a:pPr algn="ctr"/>
-            <a:r>
-              <a:rPr lang="en-US" dirty="0"/>
-              <a:t>Figure 2: Example graph clustered using the annulus test.</a:t>
-            </a:r>
-          </a:p>
-        </p:txBody>
-      </p:sp>
-    </p:spTree>
-    <p:extLst>
-      <p:ext uri="{BB962C8B-B14F-4D97-AF65-F5344CB8AC3E}">
-        <p14:creationId xmlns:p14="http://schemas.microsoft.com/office/powerpoint/2010/main" val="3281881112"/>
-      </p:ext>
-    </p:extLst>
-  </p:cSld>
-  <p:clrMapOvr>
-    <a:masterClrMapping/>
-  </p:clrMapOvr>
-</p:sld>
-</file>
-
-<file path=ppt/slides/slide16.xml><?xml version="1.0" encoding="utf-8"?>
-<p:sld xmlns:a="http://schemas.openxmlformats.org/drawingml/2006/main" xmlns:r="http://schemas.openxmlformats.org/officeDocument/2006/relationships" xmlns:p="http://schemas.openxmlformats.org/presentationml/2006/main">
-  <p:cSld>
-    <p:spTree>
-      <p:nvGrpSpPr>
-        <p:cNvPr id="1" name=""/>
-        <p:cNvGrpSpPr/>
-        <p:nvPr/>
-      </p:nvGrpSpPr>
-      <p:grpSpPr>
-        <a:xfrm>
-          <a:off x="0" y="0"/>
-          <a:ext cx="0" cy="0"/>
-          <a:chOff x="0" y="0"/>
-          <a:chExt cx="0" cy="0"/>
-        </a:xfrm>
-      </p:grpSpPr>
-      <p:sp>
-        <p:nvSpPr>
-          <p:cNvPr id="2" name="Title 1">
-            <a:extLst>
-              <a:ext uri="{FF2B5EF4-FFF2-40B4-BE49-F238E27FC236}">
                 <a16:creationId xmlns:a16="http://schemas.microsoft.com/office/drawing/2014/main" id="{067AAA5E-243E-43A7-80EB-CF5607FBD5D3}"/>
               </a:ext>
             </a:extLst>
@@ -5764,8 +5015,8 @@
           </a:p>
         </p:txBody>
       </p:sp>
-      <mc:AlternateContent xmlns:mc="http://schemas.openxmlformats.org/markup-compatibility/2006">
-        <mc:Choice xmlns:a14="http://schemas.microsoft.com/office/drawing/2010/main" Requires="a14">
+      <mc:AlternateContent xmlns:mc="http://schemas.openxmlformats.org/markup-compatibility/2006" xmlns:a14="http://schemas.microsoft.com/office/drawing/2010/main">
+        <mc:Choice Requires="a14">
           <p:sp>
             <p:nvSpPr>
               <p:cNvPr id="3" name="Content Placeholder 2">
@@ -5849,7 +5100,7 @@
             </p:txBody>
           </p:sp>
         </mc:Choice>
-        <mc:Fallback>
+        <mc:Fallback xmlns="">
           <p:sp>
             <p:nvSpPr>
               <p:cNvPr id="3" name="Content Placeholder 2">
@@ -5929,8 +5180,8 @@
           </a:prstGeom>
         </p:spPr>
       </p:pic>
-      <mc:AlternateContent xmlns:mc="http://schemas.openxmlformats.org/markup-compatibility/2006">
-        <mc:Choice xmlns:a14="http://schemas.microsoft.com/office/drawing/2010/main" Requires="a14">
+      <mc:AlternateContent xmlns:mc="http://schemas.openxmlformats.org/markup-compatibility/2006" xmlns:a14="http://schemas.microsoft.com/office/drawing/2010/main">
+        <mc:Choice Requires="a14">
           <p:sp>
             <p:nvSpPr>
               <p:cNvPr id="6" name="TextBox 5">
@@ -5979,7 +5230,7 @@
             </p:txBody>
           </p:sp>
         </mc:Choice>
-        <mc:Fallback>
+        <mc:Fallback xmlns="">
           <p:sp>
             <p:nvSpPr>
               <p:cNvPr id="6" name="TextBox 5">
@@ -6027,7 +5278,7 @@
     </p:spTree>
     <p:extLst>
       <p:ext uri="{BB962C8B-B14F-4D97-AF65-F5344CB8AC3E}">
-        <p14:creationId xmlns:p14="http://schemas.microsoft.com/office/powerpoint/2010/main" val="3903944947"/>
+        <p14:creationId xmlns:p14="http://schemas.microsoft.com/office/powerpoint/2010/main" val="277214145"/>
       </p:ext>
     </p:extLst>
   </p:cSld>
@@ -6037,7 +5288,7 @@
 </p:sld>
 </file>
 
-<file path=ppt/slides/slide17.xml><?xml version="1.0" encoding="utf-8"?>
+<file path=ppt/slides/slide14.xml><?xml version="1.0" encoding="utf-8"?>
 <p:sld xmlns:a="http://schemas.openxmlformats.org/drawingml/2006/main" xmlns:r="http://schemas.openxmlformats.org/officeDocument/2006/relationships" xmlns:p="http://schemas.openxmlformats.org/presentationml/2006/main">
   <p:cSld>
     <p:spTree>
@@ -6127,7 +5378,7 @@
 </p:sld>
 </file>
 
-<file path=ppt/slides/slide18.xml><?xml version="1.0" encoding="utf-8"?>
+<file path=ppt/slides/slide15.xml><?xml version="1.0" encoding="utf-8"?>
 <p:sld xmlns:a="http://schemas.openxmlformats.org/drawingml/2006/main" xmlns:r="http://schemas.openxmlformats.org/officeDocument/2006/relationships" xmlns:p="http://schemas.openxmlformats.org/presentationml/2006/main">
   <p:cSld>
     <p:spTree>
@@ -6288,7 +5539,7 @@
 </p:sld>
 </file>
 
-<file path=ppt/slides/slide19.xml><?xml version="1.0" encoding="utf-8"?>
+<file path=ppt/slides/slide16.xml><?xml version="1.0" encoding="utf-8"?>
 <p:sld xmlns:a="http://schemas.openxmlformats.org/drawingml/2006/main" xmlns:r="http://schemas.openxmlformats.org/officeDocument/2006/relationships" xmlns:p="http://schemas.openxmlformats.org/presentationml/2006/main">
   <p:cSld>
     <p:spTree>
@@ -6408,6 +5659,513 @@
     <p:extLst>
       <p:ext uri="{BB962C8B-B14F-4D97-AF65-F5344CB8AC3E}">
         <p14:creationId xmlns:p14="http://schemas.microsoft.com/office/powerpoint/2010/main" val="362602052"/>
+      </p:ext>
+    </p:extLst>
+  </p:cSld>
+  <p:clrMapOvr>
+    <a:masterClrMapping/>
+  </p:clrMapOvr>
+</p:sld>
+</file>
+
+<file path=ppt/slides/slide17.xml><?xml version="1.0" encoding="utf-8"?>
+<p:sld xmlns:a="http://schemas.openxmlformats.org/drawingml/2006/main" xmlns:r="http://schemas.openxmlformats.org/officeDocument/2006/relationships" xmlns:p="http://schemas.openxmlformats.org/presentationml/2006/main">
+  <p:cSld>
+    <p:spTree>
+      <p:nvGrpSpPr>
+        <p:cNvPr id="1" name=""/>
+        <p:cNvGrpSpPr/>
+        <p:nvPr/>
+      </p:nvGrpSpPr>
+      <p:grpSpPr>
+        <a:xfrm>
+          <a:off x="0" y="0"/>
+          <a:ext cx="0" cy="0"/>
+          <a:chOff x="0" y="0"/>
+          <a:chExt cx="0" cy="0"/>
+        </a:xfrm>
+      </p:grpSpPr>
+      <p:sp>
+        <p:nvSpPr>
+          <p:cNvPr id="2" name="Title 1">
+            <a:extLst>
+              <a:ext uri="{FF2B5EF4-FFF2-40B4-BE49-F238E27FC236}">
+                <a16:creationId xmlns:a16="http://schemas.microsoft.com/office/drawing/2014/main" id="{81A08639-D354-4EAB-8B66-C53717453C21}"/>
+              </a:ext>
+            </a:extLst>
+          </p:cNvPr>
+          <p:cNvSpPr>
+            <a:spLocks noGrp="1"/>
+          </p:cNvSpPr>
+          <p:nvPr>
+            <p:ph type="title"/>
+          </p:nvPr>
+        </p:nvSpPr>
+        <p:spPr/>
+        <p:txBody>
+          <a:bodyPr/>
+          <a:lstStyle/>
+          <a:p>
+            <a:r>
+              <a:rPr lang="en-US" dirty="0"/>
+              <a:t>The Algorithm Applied</a:t>
+            </a:r>
+          </a:p>
+        </p:txBody>
+      </p:sp>
+      <p:pic>
+        <p:nvPicPr>
+          <p:cNvPr id="5" name="Content Placeholder 4" descr="A picture containing colorful&#10;&#10;Description automatically generated">
+            <a:extLst>
+              <a:ext uri="{FF2B5EF4-FFF2-40B4-BE49-F238E27FC236}">
+                <a16:creationId xmlns:a16="http://schemas.microsoft.com/office/drawing/2014/main" id="{CD14CBD4-B2CC-4980-8380-016AC3B59DD0}"/>
+              </a:ext>
+            </a:extLst>
+          </p:cNvPr>
+          <p:cNvPicPr>
+            <a:picLocks noGrp="1" noChangeAspect="1"/>
+          </p:cNvPicPr>
+          <p:nvPr>
+            <p:ph idx="1"/>
+          </p:nvPr>
+        </p:nvPicPr>
+        <p:blipFill>
+          <a:blip r:embed="rId2">
+            <a:extLst>
+              <a:ext uri="{28A0092B-C50C-407E-A947-70E740481C1C}">
+                <a14:useLocalDpi xmlns:a14="http://schemas.microsoft.com/office/drawing/2010/main" val="0"/>
+              </a:ext>
+            </a:extLst>
+          </a:blip>
+          <a:stretch>
+            <a:fillRect/>
+          </a:stretch>
+        </p:blipFill>
+        <p:spPr>
+          <a:xfrm>
+            <a:off x="1588724" y="1991651"/>
+            <a:ext cx="9014551" cy="3956387"/>
+          </a:xfrm>
+        </p:spPr>
+      </p:pic>
+    </p:spTree>
+    <p:extLst>
+      <p:ext uri="{BB962C8B-B14F-4D97-AF65-F5344CB8AC3E}">
+        <p14:creationId xmlns:p14="http://schemas.microsoft.com/office/powerpoint/2010/main" val="1867866065"/>
+      </p:ext>
+    </p:extLst>
+  </p:cSld>
+  <p:clrMapOvr>
+    <a:masterClrMapping/>
+  </p:clrMapOvr>
+</p:sld>
+</file>
+
+<file path=ppt/slides/slide18.xml><?xml version="1.0" encoding="utf-8"?>
+<p:sld xmlns:a="http://schemas.openxmlformats.org/drawingml/2006/main" xmlns:r="http://schemas.openxmlformats.org/officeDocument/2006/relationships" xmlns:p="http://schemas.openxmlformats.org/presentationml/2006/main">
+  <p:cSld>
+    <p:spTree>
+      <p:nvGrpSpPr>
+        <p:cNvPr id="1" name=""/>
+        <p:cNvGrpSpPr/>
+        <p:nvPr/>
+      </p:nvGrpSpPr>
+      <p:grpSpPr>
+        <a:xfrm>
+          <a:off x="0" y="0"/>
+          <a:ext cx="0" cy="0"/>
+          <a:chOff x="0" y="0"/>
+          <a:chExt cx="0" cy="0"/>
+        </a:xfrm>
+      </p:grpSpPr>
+      <p:sp>
+        <p:nvSpPr>
+          <p:cNvPr id="2" name="Title 1">
+            <a:extLst>
+              <a:ext uri="{FF2B5EF4-FFF2-40B4-BE49-F238E27FC236}">
+                <a16:creationId xmlns:a16="http://schemas.microsoft.com/office/drawing/2014/main" id="{2847BC24-695C-4891-B24D-468B5D68F811}"/>
+              </a:ext>
+            </a:extLst>
+          </p:cNvPr>
+          <p:cNvSpPr>
+            <a:spLocks noGrp="1"/>
+          </p:cNvSpPr>
+          <p:nvPr>
+            <p:ph type="title"/>
+          </p:nvPr>
+        </p:nvSpPr>
+        <p:spPr/>
+        <p:txBody>
+          <a:bodyPr/>
+          <a:lstStyle/>
+          <a:p>
+            <a:r>
+              <a:rPr lang="en-US" dirty="0"/>
+              <a:t>The Algorithm Applied</a:t>
+            </a:r>
+          </a:p>
+        </p:txBody>
+      </p:sp>
+      <p:pic>
+        <p:nvPicPr>
+          <p:cNvPr id="9" name="Content Placeholder 8" descr="A picture containing tree, drawing, flower&#10;&#10;Description automatically generated">
+            <a:extLst>
+              <a:ext uri="{FF2B5EF4-FFF2-40B4-BE49-F238E27FC236}">
+                <a16:creationId xmlns:a16="http://schemas.microsoft.com/office/drawing/2014/main" id="{FF72EC76-4BFB-48A5-A2B3-FF2759823F2F}"/>
+              </a:ext>
+            </a:extLst>
+          </p:cNvPr>
+          <p:cNvPicPr>
+            <a:picLocks noGrp="1" noChangeAspect="1"/>
+          </p:cNvPicPr>
+          <p:nvPr>
+            <p:ph idx="1"/>
+          </p:nvPr>
+        </p:nvPicPr>
+        <p:blipFill>
+          <a:blip r:embed="rId2">
+            <a:extLst>
+              <a:ext uri="{28A0092B-C50C-407E-A947-70E740481C1C}">
+                <a14:useLocalDpi xmlns:a14="http://schemas.microsoft.com/office/drawing/2010/main" val="0"/>
+              </a:ext>
+            </a:extLst>
+          </a:blip>
+          <a:stretch>
+            <a:fillRect/>
+          </a:stretch>
+        </p:blipFill>
+        <p:spPr>
+          <a:xfrm>
+            <a:off x="1066800" y="2704378"/>
+            <a:ext cx="10058400" cy="2416263"/>
+          </a:xfrm>
+        </p:spPr>
+      </p:pic>
+    </p:spTree>
+    <p:extLst>
+      <p:ext uri="{BB962C8B-B14F-4D97-AF65-F5344CB8AC3E}">
+        <p14:creationId xmlns:p14="http://schemas.microsoft.com/office/powerpoint/2010/main" val="2314819751"/>
+      </p:ext>
+    </p:extLst>
+  </p:cSld>
+  <p:clrMapOvr>
+    <a:masterClrMapping/>
+  </p:clrMapOvr>
+</p:sld>
+</file>
+
+<file path=ppt/slides/slide19.xml><?xml version="1.0" encoding="utf-8"?>
+<p:sld xmlns:a="http://schemas.openxmlformats.org/drawingml/2006/main" xmlns:r="http://schemas.openxmlformats.org/officeDocument/2006/relationships" xmlns:p="http://schemas.openxmlformats.org/presentationml/2006/main">
+  <p:cSld>
+    <p:spTree>
+      <p:nvGrpSpPr>
+        <p:cNvPr id="1" name=""/>
+        <p:cNvGrpSpPr/>
+        <p:nvPr/>
+      </p:nvGrpSpPr>
+      <p:grpSpPr>
+        <a:xfrm>
+          <a:off x="0" y="0"/>
+          <a:ext cx="0" cy="0"/>
+          <a:chOff x="0" y="0"/>
+          <a:chExt cx="0" cy="0"/>
+        </a:xfrm>
+      </p:grpSpPr>
+      <p:sp>
+        <p:nvSpPr>
+          <p:cNvPr id="2" name="Title 1">
+            <a:extLst>
+              <a:ext uri="{FF2B5EF4-FFF2-40B4-BE49-F238E27FC236}">
+                <a16:creationId xmlns:a16="http://schemas.microsoft.com/office/drawing/2014/main" id="{E5F54288-055C-4148-93BE-291C4ABF82B7}"/>
+              </a:ext>
+            </a:extLst>
+          </p:cNvPr>
+          <p:cNvSpPr>
+            <a:spLocks noGrp="1"/>
+          </p:cNvSpPr>
+          <p:nvPr>
+            <p:ph type="title"/>
+          </p:nvPr>
+        </p:nvSpPr>
+        <p:spPr/>
+        <p:txBody>
+          <a:bodyPr/>
+          <a:lstStyle/>
+          <a:p>
+            <a:r>
+              <a:rPr lang="en-US" dirty="0"/>
+              <a:t>References</a:t>
+            </a:r>
+          </a:p>
+        </p:txBody>
+      </p:sp>
+      <p:sp>
+        <p:nvSpPr>
+          <p:cNvPr id="3" name="Content Placeholder 2">
+            <a:extLst>
+              <a:ext uri="{FF2B5EF4-FFF2-40B4-BE49-F238E27FC236}">
+                <a16:creationId xmlns:a16="http://schemas.microsoft.com/office/drawing/2014/main" id="{CA23B9A8-A1B5-4CAE-8833-61E364208E1B}"/>
+              </a:ext>
+            </a:extLst>
+          </p:cNvPr>
+          <p:cNvSpPr>
+            <a:spLocks noGrp="1"/>
+          </p:cNvSpPr>
+          <p:nvPr>
+            <p:ph idx="1"/>
+          </p:nvPr>
+        </p:nvSpPr>
+        <p:spPr/>
+        <p:txBody>
+          <a:bodyPr>
+            <a:normAutofit/>
+          </a:bodyPr>
+          <a:lstStyle/>
+          <a:p>
+            <a:pPr marL="457200" indent="-457200">
+              <a:buFont typeface="+mj-lt"/>
+              <a:buAutoNum type="arabicPeriod"/>
+            </a:pPr>
+            <a:r>
+              <a:rPr lang="en-US" sz="1400" dirty="0"/>
+              <a:t>A. Hatcher (2002). </a:t>
+            </a:r>
+            <a:r>
+              <a:rPr lang="en-US" sz="1400" i="1" dirty="0"/>
+              <a:t>Algebraic Topology</a:t>
+            </a:r>
+            <a:r>
+              <a:rPr lang="en-US" sz="1400" dirty="0"/>
+              <a:t>. Cambridge University Press. Available at </a:t>
+            </a:r>
+            <a:r>
+              <a:rPr lang="en-US" sz="1400" dirty="0">
+                <a:hlinkClick r:id="rId2"/>
+              </a:rPr>
+              <a:t>https://pi.math.cornell.edu/~hatcher/AT/AT.pdf</a:t>
+            </a:r>
+            <a:endParaRPr lang="en-US" sz="1400" dirty="0"/>
+          </a:p>
+          <a:p>
+            <a:pPr marL="457200" indent="-457200">
+              <a:buFont typeface="+mj-lt"/>
+              <a:buAutoNum type="arabicPeriod"/>
+            </a:pPr>
+            <a:r>
+              <a:rPr lang="en-US" sz="1400" dirty="0"/>
+              <a:t>M. Kerber, D. Morozov, A. </a:t>
+            </a:r>
+            <a:r>
+              <a:rPr lang="en-US" sz="1400" dirty="0" err="1"/>
+              <a:t>Nigmetov</a:t>
+            </a:r>
+            <a:r>
+              <a:rPr lang="en-US" sz="1400" dirty="0"/>
+              <a:t> (2016). </a:t>
+            </a:r>
+            <a:r>
+              <a:rPr lang="en-US" sz="1400" i="1" dirty="0"/>
+              <a:t>Geometry Helps to Compare Persistence Diagrams</a:t>
+            </a:r>
+            <a:r>
+              <a:rPr lang="en-US" sz="1400" dirty="0"/>
+              <a:t>. Available at </a:t>
+            </a:r>
+            <a:r>
+              <a:rPr lang="en-US" sz="1400" dirty="0">
+                <a:hlinkClick r:id="rId3"/>
+              </a:rPr>
+              <a:t>https://arxiv.org/abs/1606.03357</a:t>
+            </a:r>
+            <a:endParaRPr lang="en-US" sz="1400" dirty="0"/>
+          </a:p>
+          <a:p>
+            <a:pPr marL="457200" indent="-457200">
+              <a:buFont typeface="+mj-lt"/>
+              <a:buAutoNum type="arabicPeriod"/>
+            </a:pPr>
+            <a:r>
+              <a:rPr lang="en-US" sz="1400" dirty="0"/>
+              <a:t>B. </a:t>
+            </a:r>
+            <a:r>
+              <a:rPr lang="en-US" sz="1400" dirty="0" err="1"/>
+              <a:t>Slininger</a:t>
+            </a:r>
+            <a:r>
+              <a:rPr lang="en-US" sz="1400" dirty="0"/>
+              <a:t>. </a:t>
+            </a:r>
+            <a:r>
+              <a:rPr lang="en-US" sz="1400" i="1" dirty="0"/>
+              <a:t>Fiedler's Theory of Spectral Graph Partitioning</a:t>
+            </a:r>
+            <a:r>
+              <a:rPr lang="en-US" sz="1400" dirty="0"/>
+              <a:t>. Available at </a:t>
+            </a:r>
+            <a:r>
+              <a:rPr lang="en-US" sz="1400" dirty="0">
+                <a:hlinkClick r:id="rId4"/>
+              </a:rPr>
+              <a:t>http://citeseerx.ist.psu.edu/viewdoc/download?doi=10.1.1.592.1730\&amp;rep=rep1\&amp;type=pdf</a:t>
+            </a:r>
+            <a:r>
+              <a:rPr lang="en-US" sz="1400" dirty="0"/>
+              <a:t> </a:t>
+            </a:r>
+          </a:p>
+          <a:p>
+            <a:pPr marL="457200" indent="-457200">
+              <a:buFont typeface="+mj-lt"/>
+              <a:buAutoNum type="arabicPeriod"/>
+            </a:pPr>
+            <a:r>
+              <a:rPr lang="en-US" sz="1400" dirty="0"/>
+              <a:t>D. Spivak (2009). </a:t>
+            </a:r>
+            <a:r>
+              <a:rPr lang="en-US" sz="1400" i="1" dirty="0"/>
+              <a:t>Higher-dimensional models of networks</a:t>
+            </a:r>
+            <a:r>
+              <a:rPr lang="en-US" sz="1400" dirty="0"/>
+              <a:t>. Available at </a:t>
+            </a:r>
+            <a:r>
+              <a:rPr lang="en-US" sz="1400" dirty="0">
+                <a:hlinkClick r:id="rId5"/>
+              </a:rPr>
+              <a:t>https://arxiv.org/abs/0909.4314</a:t>
+            </a:r>
+            <a:r>
+              <a:rPr lang="en-US" sz="1400" dirty="0"/>
+              <a:t> </a:t>
+            </a:r>
+          </a:p>
+          <a:p>
+            <a:pPr marL="457200" indent="-457200">
+              <a:buFont typeface="+mj-lt"/>
+              <a:buAutoNum type="arabicPeriod"/>
+            </a:pPr>
+            <a:r>
+              <a:rPr lang="en-US" sz="1400" dirty="0"/>
+              <a:t>S. Bhatia, B. Chatterjee, D. </a:t>
+            </a:r>
+            <a:r>
+              <a:rPr lang="en-US" sz="1400" dirty="0" err="1"/>
+              <a:t>Nathani</a:t>
+            </a:r>
+            <a:r>
+              <a:rPr lang="en-US" sz="1400" dirty="0"/>
+              <a:t>, M. Kaul (2018). </a:t>
+            </a:r>
+            <a:r>
+              <a:rPr lang="en-US" sz="1400" i="1" dirty="0"/>
+              <a:t>Understanding and Predicting Links in Graphs: A Persistent Homology Perspective</a:t>
+            </a:r>
+            <a:r>
+              <a:rPr lang="en-US" sz="1400" dirty="0"/>
+              <a:t>. Available at </a:t>
+            </a:r>
+            <a:r>
+              <a:rPr lang="en-US" sz="1400" dirty="0">
+                <a:hlinkClick r:id="rId6"/>
+              </a:rPr>
+              <a:t>https://arxiv.org/abs/1811.04049</a:t>
+            </a:r>
+            <a:endParaRPr lang="en-US" sz="1400" dirty="0"/>
+          </a:p>
+          <a:p>
+            <a:pPr marL="457200" indent="-457200">
+              <a:buFont typeface="+mj-lt"/>
+              <a:buAutoNum type="arabicPeriod"/>
+            </a:pPr>
+            <a:r>
+              <a:rPr lang="en-US" sz="1400" dirty="0"/>
+              <a:t>D. Yan, L. Huang, M. Jordan. </a:t>
+            </a:r>
+            <a:r>
+              <a:rPr lang="en-US" sz="1400" i="1" dirty="0"/>
+              <a:t>Fast Approximate Spectral Clustering</a:t>
+            </a:r>
+            <a:r>
+              <a:rPr lang="en-US" sz="1400" dirty="0"/>
+              <a:t>. Available at </a:t>
+            </a:r>
+            <a:r>
+              <a:rPr lang="en-US" sz="1400" dirty="0">
+                <a:hlinkClick r:id="rId7"/>
+              </a:rPr>
+              <a:t>https://people.eecs.berkeley.edu/~jordan/papers/yan-etal-long.pdf</a:t>
+            </a:r>
+            <a:endParaRPr lang="en-US" sz="1400" dirty="0"/>
+          </a:p>
+          <a:p>
+            <a:pPr marL="457200" indent="-457200">
+              <a:buFont typeface="+mj-lt"/>
+              <a:buAutoNum type="arabicPeriod"/>
+            </a:pPr>
+            <a:r>
+              <a:rPr lang="en-US" sz="1400" dirty="0"/>
+              <a:t>D. </a:t>
+            </a:r>
+            <a:r>
+              <a:rPr lang="en-US" sz="1400" dirty="0" err="1"/>
+              <a:t>Centola</a:t>
+            </a:r>
+            <a:r>
+              <a:rPr lang="en-US" sz="1400" dirty="0"/>
+              <a:t>, M. Macy. </a:t>
+            </a:r>
+            <a:r>
+              <a:rPr lang="en-US" sz="1400" i="1" dirty="0"/>
+              <a:t>Complex contagions and the weakness of long ties</a:t>
+            </a:r>
+            <a:r>
+              <a:rPr lang="en-US" sz="1400" dirty="0"/>
+              <a:t>. In: American Journal of Sociology 113.3 (2007), pp. 702-734.</a:t>
+            </a:r>
+          </a:p>
+          <a:p>
+            <a:pPr marL="457200" indent="-457200">
+              <a:buFont typeface="+mj-lt"/>
+              <a:buAutoNum type="arabicPeriod"/>
+            </a:pPr>
+            <a:r>
+              <a:rPr lang="en-US" sz="1400" dirty="0"/>
+              <a:t>R. Ram, M. </a:t>
+            </a:r>
+            <a:r>
+              <a:rPr lang="en-US" sz="1400" dirty="0" err="1"/>
+              <a:t>Rizoiu</a:t>
+            </a:r>
+            <a:r>
+              <a:rPr lang="en-US" sz="1400" dirty="0"/>
+              <a:t> (2019). </a:t>
+            </a:r>
+            <a:r>
+              <a:rPr lang="en-US" sz="1400" i="1" dirty="0"/>
+              <a:t>A social science-grounded approach for quantifying online social influence</a:t>
+            </a:r>
+            <a:r>
+              <a:rPr lang="en-US" sz="1400" dirty="0"/>
+              <a:t>. In: Australian Social Network Analysis Conference (ASNAC'19) (p. 2). Adelaide, Australia.</a:t>
+            </a:r>
+          </a:p>
+          <a:p>
+            <a:pPr marL="457200" indent="-457200">
+              <a:buFont typeface="+mj-lt"/>
+              <a:buAutoNum type="arabicPeriod"/>
+            </a:pPr>
+            <a:endParaRPr lang="en-US" sz="1400" dirty="0"/>
+          </a:p>
+        </p:txBody>
+      </p:sp>
+    </p:spTree>
+    <p:extLst>
+      <p:ext uri="{BB962C8B-B14F-4D97-AF65-F5344CB8AC3E}">
+        <p14:creationId xmlns:p14="http://schemas.microsoft.com/office/powerpoint/2010/main" val="1739469402"/>
       </p:ext>
     </p:extLst>
   </p:cSld>
@@ -6735,513 +6493,6 @@
     <p:extLst>
       <p:ext uri="{BB962C8B-B14F-4D97-AF65-F5344CB8AC3E}">
         <p14:creationId xmlns:p14="http://schemas.microsoft.com/office/powerpoint/2010/main" val="3549722022"/>
-      </p:ext>
-    </p:extLst>
-  </p:cSld>
-  <p:clrMapOvr>
-    <a:masterClrMapping/>
-  </p:clrMapOvr>
-</p:sld>
-</file>
-
-<file path=ppt/slides/slide20.xml><?xml version="1.0" encoding="utf-8"?>
-<p:sld xmlns:a="http://schemas.openxmlformats.org/drawingml/2006/main" xmlns:r="http://schemas.openxmlformats.org/officeDocument/2006/relationships" xmlns:p="http://schemas.openxmlformats.org/presentationml/2006/main">
-  <p:cSld>
-    <p:spTree>
-      <p:nvGrpSpPr>
-        <p:cNvPr id="1" name=""/>
-        <p:cNvGrpSpPr/>
-        <p:nvPr/>
-      </p:nvGrpSpPr>
-      <p:grpSpPr>
-        <a:xfrm>
-          <a:off x="0" y="0"/>
-          <a:ext cx="0" cy="0"/>
-          <a:chOff x="0" y="0"/>
-          <a:chExt cx="0" cy="0"/>
-        </a:xfrm>
-      </p:grpSpPr>
-      <p:sp>
-        <p:nvSpPr>
-          <p:cNvPr id="2" name="Title 1">
-            <a:extLst>
-              <a:ext uri="{FF2B5EF4-FFF2-40B4-BE49-F238E27FC236}">
-                <a16:creationId xmlns:a16="http://schemas.microsoft.com/office/drawing/2014/main" id="{81A08639-D354-4EAB-8B66-C53717453C21}"/>
-              </a:ext>
-            </a:extLst>
-          </p:cNvPr>
-          <p:cNvSpPr>
-            <a:spLocks noGrp="1"/>
-          </p:cNvSpPr>
-          <p:nvPr>
-            <p:ph type="title"/>
-          </p:nvPr>
-        </p:nvSpPr>
-        <p:spPr/>
-        <p:txBody>
-          <a:bodyPr/>
-          <a:lstStyle/>
-          <a:p>
-            <a:r>
-              <a:rPr lang="en-US" dirty="0"/>
-              <a:t>The Algorithm Applied</a:t>
-            </a:r>
-          </a:p>
-        </p:txBody>
-      </p:sp>
-      <p:pic>
-        <p:nvPicPr>
-          <p:cNvPr id="5" name="Content Placeholder 4" descr="A picture containing colorful&#10;&#10;Description automatically generated">
-            <a:extLst>
-              <a:ext uri="{FF2B5EF4-FFF2-40B4-BE49-F238E27FC236}">
-                <a16:creationId xmlns:a16="http://schemas.microsoft.com/office/drawing/2014/main" id="{CD14CBD4-B2CC-4980-8380-016AC3B59DD0}"/>
-              </a:ext>
-            </a:extLst>
-          </p:cNvPr>
-          <p:cNvPicPr>
-            <a:picLocks noGrp="1" noChangeAspect="1"/>
-          </p:cNvPicPr>
-          <p:nvPr>
-            <p:ph idx="1"/>
-          </p:nvPr>
-        </p:nvPicPr>
-        <p:blipFill>
-          <a:blip r:embed="rId2">
-            <a:extLst>
-              <a:ext uri="{28A0092B-C50C-407E-A947-70E740481C1C}">
-                <a14:useLocalDpi xmlns:a14="http://schemas.microsoft.com/office/drawing/2010/main" val="0"/>
-              </a:ext>
-            </a:extLst>
-          </a:blip>
-          <a:stretch>
-            <a:fillRect/>
-          </a:stretch>
-        </p:blipFill>
-        <p:spPr>
-          <a:xfrm>
-            <a:off x="1588724" y="1991651"/>
-            <a:ext cx="9014551" cy="3956387"/>
-          </a:xfrm>
-        </p:spPr>
-      </p:pic>
-    </p:spTree>
-    <p:extLst>
-      <p:ext uri="{BB962C8B-B14F-4D97-AF65-F5344CB8AC3E}">
-        <p14:creationId xmlns:p14="http://schemas.microsoft.com/office/powerpoint/2010/main" val="1867866065"/>
-      </p:ext>
-    </p:extLst>
-  </p:cSld>
-  <p:clrMapOvr>
-    <a:masterClrMapping/>
-  </p:clrMapOvr>
-</p:sld>
-</file>
-
-<file path=ppt/slides/slide21.xml><?xml version="1.0" encoding="utf-8"?>
-<p:sld xmlns:a="http://schemas.openxmlformats.org/drawingml/2006/main" xmlns:r="http://schemas.openxmlformats.org/officeDocument/2006/relationships" xmlns:p="http://schemas.openxmlformats.org/presentationml/2006/main">
-  <p:cSld>
-    <p:spTree>
-      <p:nvGrpSpPr>
-        <p:cNvPr id="1" name=""/>
-        <p:cNvGrpSpPr/>
-        <p:nvPr/>
-      </p:nvGrpSpPr>
-      <p:grpSpPr>
-        <a:xfrm>
-          <a:off x="0" y="0"/>
-          <a:ext cx="0" cy="0"/>
-          <a:chOff x="0" y="0"/>
-          <a:chExt cx="0" cy="0"/>
-        </a:xfrm>
-      </p:grpSpPr>
-      <p:sp>
-        <p:nvSpPr>
-          <p:cNvPr id="2" name="Title 1">
-            <a:extLst>
-              <a:ext uri="{FF2B5EF4-FFF2-40B4-BE49-F238E27FC236}">
-                <a16:creationId xmlns:a16="http://schemas.microsoft.com/office/drawing/2014/main" id="{2847BC24-695C-4891-B24D-468B5D68F811}"/>
-              </a:ext>
-            </a:extLst>
-          </p:cNvPr>
-          <p:cNvSpPr>
-            <a:spLocks noGrp="1"/>
-          </p:cNvSpPr>
-          <p:nvPr>
-            <p:ph type="title"/>
-          </p:nvPr>
-        </p:nvSpPr>
-        <p:spPr/>
-        <p:txBody>
-          <a:bodyPr/>
-          <a:lstStyle/>
-          <a:p>
-            <a:r>
-              <a:rPr lang="en-US" dirty="0"/>
-              <a:t>The Algorithm Applied</a:t>
-            </a:r>
-          </a:p>
-        </p:txBody>
-      </p:sp>
-      <p:pic>
-        <p:nvPicPr>
-          <p:cNvPr id="9" name="Content Placeholder 8" descr="A picture containing tree, drawing, flower&#10;&#10;Description automatically generated">
-            <a:extLst>
-              <a:ext uri="{FF2B5EF4-FFF2-40B4-BE49-F238E27FC236}">
-                <a16:creationId xmlns:a16="http://schemas.microsoft.com/office/drawing/2014/main" id="{FF72EC76-4BFB-48A5-A2B3-FF2759823F2F}"/>
-              </a:ext>
-            </a:extLst>
-          </p:cNvPr>
-          <p:cNvPicPr>
-            <a:picLocks noGrp="1" noChangeAspect="1"/>
-          </p:cNvPicPr>
-          <p:nvPr>
-            <p:ph idx="1"/>
-          </p:nvPr>
-        </p:nvPicPr>
-        <p:blipFill>
-          <a:blip r:embed="rId2">
-            <a:extLst>
-              <a:ext uri="{28A0092B-C50C-407E-A947-70E740481C1C}">
-                <a14:useLocalDpi xmlns:a14="http://schemas.microsoft.com/office/drawing/2010/main" val="0"/>
-              </a:ext>
-            </a:extLst>
-          </a:blip>
-          <a:stretch>
-            <a:fillRect/>
-          </a:stretch>
-        </p:blipFill>
-        <p:spPr>
-          <a:xfrm>
-            <a:off x="1066800" y="2704378"/>
-            <a:ext cx="10058400" cy="2416263"/>
-          </a:xfrm>
-        </p:spPr>
-      </p:pic>
-    </p:spTree>
-    <p:extLst>
-      <p:ext uri="{BB962C8B-B14F-4D97-AF65-F5344CB8AC3E}">
-        <p14:creationId xmlns:p14="http://schemas.microsoft.com/office/powerpoint/2010/main" val="2314819751"/>
-      </p:ext>
-    </p:extLst>
-  </p:cSld>
-  <p:clrMapOvr>
-    <a:masterClrMapping/>
-  </p:clrMapOvr>
-</p:sld>
-</file>
-
-<file path=ppt/slides/slide22.xml><?xml version="1.0" encoding="utf-8"?>
-<p:sld xmlns:a="http://schemas.openxmlformats.org/drawingml/2006/main" xmlns:r="http://schemas.openxmlformats.org/officeDocument/2006/relationships" xmlns:p="http://schemas.openxmlformats.org/presentationml/2006/main">
-  <p:cSld>
-    <p:spTree>
-      <p:nvGrpSpPr>
-        <p:cNvPr id="1" name=""/>
-        <p:cNvGrpSpPr/>
-        <p:nvPr/>
-      </p:nvGrpSpPr>
-      <p:grpSpPr>
-        <a:xfrm>
-          <a:off x="0" y="0"/>
-          <a:ext cx="0" cy="0"/>
-          <a:chOff x="0" y="0"/>
-          <a:chExt cx="0" cy="0"/>
-        </a:xfrm>
-      </p:grpSpPr>
-      <p:sp>
-        <p:nvSpPr>
-          <p:cNvPr id="2" name="Title 1">
-            <a:extLst>
-              <a:ext uri="{FF2B5EF4-FFF2-40B4-BE49-F238E27FC236}">
-                <a16:creationId xmlns:a16="http://schemas.microsoft.com/office/drawing/2014/main" id="{E5F54288-055C-4148-93BE-291C4ABF82B7}"/>
-              </a:ext>
-            </a:extLst>
-          </p:cNvPr>
-          <p:cNvSpPr>
-            <a:spLocks noGrp="1"/>
-          </p:cNvSpPr>
-          <p:nvPr>
-            <p:ph type="title"/>
-          </p:nvPr>
-        </p:nvSpPr>
-        <p:spPr/>
-        <p:txBody>
-          <a:bodyPr/>
-          <a:lstStyle/>
-          <a:p>
-            <a:r>
-              <a:rPr lang="en-US" dirty="0"/>
-              <a:t>References</a:t>
-            </a:r>
-          </a:p>
-        </p:txBody>
-      </p:sp>
-      <p:sp>
-        <p:nvSpPr>
-          <p:cNvPr id="3" name="Content Placeholder 2">
-            <a:extLst>
-              <a:ext uri="{FF2B5EF4-FFF2-40B4-BE49-F238E27FC236}">
-                <a16:creationId xmlns:a16="http://schemas.microsoft.com/office/drawing/2014/main" id="{CA23B9A8-A1B5-4CAE-8833-61E364208E1B}"/>
-              </a:ext>
-            </a:extLst>
-          </p:cNvPr>
-          <p:cNvSpPr>
-            <a:spLocks noGrp="1"/>
-          </p:cNvSpPr>
-          <p:nvPr>
-            <p:ph idx="1"/>
-          </p:nvPr>
-        </p:nvSpPr>
-        <p:spPr/>
-        <p:txBody>
-          <a:bodyPr>
-            <a:normAutofit/>
-          </a:bodyPr>
-          <a:lstStyle/>
-          <a:p>
-            <a:pPr marL="457200" indent="-457200">
-              <a:buFont typeface="+mj-lt"/>
-              <a:buAutoNum type="arabicPeriod"/>
-            </a:pPr>
-            <a:r>
-              <a:rPr lang="en-US" sz="1400" dirty="0"/>
-              <a:t>A. Hatcher (2002). </a:t>
-            </a:r>
-            <a:r>
-              <a:rPr lang="en-US" sz="1400" i="1" dirty="0"/>
-              <a:t>Algebraic Topology</a:t>
-            </a:r>
-            <a:r>
-              <a:rPr lang="en-US" sz="1400" dirty="0"/>
-              <a:t>. Cambridge University Press. Available at </a:t>
-            </a:r>
-            <a:r>
-              <a:rPr lang="en-US" sz="1400" dirty="0">
-                <a:hlinkClick r:id="rId2"/>
-              </a:rPr>
-              <a:t>https://pi.math.cornell.edu/~hatcher/AT/AT.pdf</a:t>
-            </a:r>
-            <a:endParaRPr lang="en-US" sz="1400" dirty="0"/>
-          </a:p>
-          <a:p>
-            <a:pPr marL="457200" indent="-457200">
-              <a:buFont typeface="+mj-lt"/>
-              <a:buAutoNum type="arabicPeriod"/>
-            </a:pPr>
-            <a:r>
-              <a:rPr lang="en-US" sz="1400" dirty="0"/>
-              <a:t>M. Kerber, D. Morozov, A. </a:t>
-            </a:r>
-            <a:r>
-              <a:rPr lang="en-US" sz="1400" dirty="0" err="1"/>
-              <a:t>Nigmetov</a:t>
-            </a:r>
-            <a:r>
-              <a:rPr lang="en-US" sz="1400" dirty="0"/>
-              <a:t> (2016). </a:t>
-            </a:r>
-            <a:r>
-              <a:rPr lang="en-US" sz="1400" i="1" dirty="0"/>
-              <a:t>Geometry Helps to Compare Persistence Diagrams</a:t>
-            </a:r>
-            <a:r>
-              <a:rPr lang="en-US" sz="1400" dirty="0"/>
-              <a:t>. Available at </a:t>
-            </a:r>
-            <a:r>
-              <a:rPr lang="en-US" sz="1400" dirty="0">
-                <a:hlinkClick r:id="rId3"/>
-              </a:rPr>
-              <a:t>https://arxiv.org/abs/1606.03357</a:t>
-            </a:r>
-            <a:endParaRPr lang="en-US" sz="1400" dirty="0"/>
-          </a:p>
-          <a:p>
-            <a:pPr marL="457200" indent="-457200">
-              <a:buFont typeface="+mj-lt"/>
-              <a:buAutoNum type="arabicPeriod"/>
-            </a:pPr>
-            <a:r>
-              <a:rPr lang="en-US" sz="1400" dirty="0"/>
-              <a:t>B. </a:t>
-            </a:r>
-            <a:r>
-              <a:rPr lang="en-US" sz="1400" dirty="0" err="1"/>
-              <a:t>Slininger</a:t>
-            </a:r>
-            <a:r>
-              <a:rPr lang="en-US" sz="1400" dirty="0"/>
-              <a:t>. </a:t>
-            </a:r>
-            <a:r>
-              <a:rPr lang="en-US" sz="1400" i="1" dirty="0"/>
-              <a:t>Fiedler's Theory of Spectral Graph Partitioning</a:t>
-            </a:r>
-            <a:r>
-              <a:rPr lang="en-US" sz="1400" dirty="0"/>
-              <a:t>. Available at </a:t>
-            </a:r>
-            <a:r>
-              <a:rPr lang="en-US" sz="1400" dirty="0">
-                <a:hlinkClick r:id="rId4"/>
-              </a:rPr>
-              <a:t>http://citeseerx.ist.psu.edu/viewdoc/download?doi=10.1.1.592.1730\&amp;rep=rep1\&amp;type=pdf</a:t>
-            </a:r>
-            <a:r>
-              <a:rPr lang="en-US" sz="1400" dirty="0"/>
-              <a:t> </a:t>
-            </a:r>
-          </a:p>
-          <a:p>
-            <a:pPr marL="457200" indent="-457200">
-              <a:buFont typeface="+mj-lt"/>
-              <a:buAutoNum type="arabicPeriod"/>
-            </a:pPr>
-            <a:r>
-              <a:rPr lang="en-US" sz="1400" dirty="0"/>
-              <a:t>D. Spivak (2009). </a:t>
-            </a:r>
-            <a:r>
-              <a:rPr lang="en-US" sz="1400" i="1" dirty="0"/>
-              <a:t>Higher-dimensional models of networks</a:t>
-            </a:r>
-            <a:r>
-              <a:rPr lang="en-US" sz="1400" dirty="0"/>
-              <a:t>. Available at </a:t>
-            </a:r>
-            <a:r>
-              <a:rPr lang="en-US" sz="1400" dirty="0">
-                <a:hlinkClick r:id="rId5"/>
-              </a:rPr>
-              <a:t>https://arxiv.org/abs/0909.4314</a:t>
-            </a:r>
-            <a:r>
-              <a:rPr lang="en-US" sz="1400" dirty="0"/>
-              <a:t> </a:t>
-            </a:r>
-          </a:p>
-          <a:p>
-            <a:pPr marL="457200" indent="-457200">
-              <a:buFont typeface="+mj-lt"/>
-              <a:buAutoNum type="arabicPeriod"/>
-            </a:pPr>
-            <a:r>
-              <a:rPr lang="en-US" sz="1400" dirty="0"/>
-              <a:t>S. Bhatia, B. Chatterjee, D. </a:t>
-            </a:r>
-            <a:r>
-              <a:rPr lang="en-US" sz="1400" dirty="0" err="1"/>
-              <a:t>Nathani</a:t>
-            </a:r>
-            <a:r>
-              <a:rPr lang="en-US" sz="1400" dirty="0"/>
-              <a:t>, M. Kaul (2018). </a:t>
-            </a:r>
-            <a:r>
-              <a:rPr lang="en-US" sz="1400" i="1" dirty="0"/>
-              <a:t>Understanding and Predicting Links in Graphs: A Persistent Homology Perspective</a:t>
-            </a:r>
-            <a:r>
-              <a:rPr lang="en-US" sz="1400" dirty="0"/>
-              <a:t>. Available at </a:t>
-            </a:r>
-            <a:r>
-              <a:rPr lang="en-US" sz="1400" dirty="0">
-                <a:hlinkClick r:id="rId6"/>
-              </a:rPr>
-              <a:t>https://arxiv.org/abs/1811.04049</a:t>
-            </a:r>
-            <a:endParaRPr lang="en-US" sz="1400" dirty="0"/>
-          </a:p>
-          <a:p>
-            <a:pPr marL="457200" indent="-457200">
-              <a:buFont typeface="+mj-lt"/>
-              <a:buAutoNum type="arabicPeriod"/>
-            </a:pPr>
-            <a:r>
-              <a:rPr lang="en-US" sz="1400" dirty="0"/>
-              <a:t>D. Yan, L. Huang, M. Jordan. </a:t>
-            </a:r>
-            <a:r>
-              <a:rPr lang="en-US" sz="1400" i="1" dirty="0"/>
-              <a:t>Fast Approximate Spectral Clustering</a:t>
-            </a:r>
-            <a:r>
-              <a:rPr lang="en-US" sz="1400" dirty="0"/>
-              <a:t>. Available at </a:t>
-            </a:r>
-            <a:r>
-              <a:rPr lang="en-US" sz="1400" dirty="0">
-                <a:hlinkClick r:id="rId7"/>
-              </a:rPr>
-              <a:t>https://people.eecs.berkeley.edu/~jordan/papers/yan-etal-long.pdf</a:t>
-            </a:r>
-            <a:endParaRPr lang="en-US" sz="1400" dirty="0"/>
-          </a:p>
-          <a:p>
-            <a:pPr marL="457200" indent="-457200">
-              <a:buFont typeface="+mj-lt"/>
-              <a:buAutoNum type="arabicPeriod"/>
-            </a:pPr>
-            <a:r>
-              <a:rPr lang="en-US" sz="1400" dirty="0"/>
-              <a:t>D. </a:t>
-            </a:r>
-            <a:r>
-              <a:rPr lang="en-US" sz="1400" dirty="0" err="1"/>
-              <a:t>Centola</a:t>
-            </a:r>
-            <a:r>
-              <a:rPr lang="en-US" sz="1400" dirty="0"/>
-              <a:t>, M. Macy. </a:t>
-            </a:r>
-            <a:r>
-              <a:rPr lang="en-US" sz="1400" i="1" dirty="0"/>
-              <a:t>Complex contagions and the weakness of long ties</a:t>
-            </a:r>
-            <a:r>
-              <a:rPr lang="en-US" sz="1400" dirty="0"/>
-              <a:t>. In: American Journal of Sociology 113.3 (2007), pp. 702-734.</a:t>
-            </a:r>
-          </a:p>
-          <a:p>
-            <a:pPr marL="457200" indent="-457200">
-              <a:buFont typeface="+mj-lt"/>
-              <a:buAutoNum type="arabicPeriod"/>
-            </a:pPr>
-            <a:r>
-              <a:rPr lang="en-US" sz="1400" dirty="0"/>
-              <a:t>R. Ram, M. </a:t>
-            </a:r>
-            <a:r>
-              <a:rPr lang="en-US" sz="1400" dirty="0" err="1"/>
-              <a:t>Rizoiu</a:t>
-            </a:r>
-            <a:r>
-              <a:rPr lang="en-US" sz="1400" dirty="0"/>
-              <a:t> (2019). </a:t>
-            </a:r>
-            <a:r>
-              <a:rPr lang="en-US" sz="1400" i="1" dirty="0"/>
-              <a:t>A social science-grounded approach for quantifying online social influence</a:t>
-            </a:r>
-            <a:r>
-              <a:rPr lang="en-US" sz="1400" dirty="0"/>
-              <a:t>. In: Australian Social Network Analysis Conference (ASNAC'19) (p. 2). Adelaide, Australia.</a:t>
-            </a:r>
-          </a:p>
-          <a:p>
-            <a:pPr marL="457200" indent="-457200">
-              <a:buFont typeface="+mj-lt"/>
-              <a:buAutoNum type="arabicPeriod"/>
-            </a:pPr>
-            <a:endParaRPr lang="en-US" sz="1400" dirty="0"/>
-          </a:p>
-        </p:txBody>
-      </p:sp>
-    </p:spTree>
-    <p:extLst>
-      <p:ext uri="{BB962C8B-B14F-4D97-AF65-F5344CB8AC3E}">
-        <p14:creationId xmlns:p14="http://schemas.microsoft.com/office/powerpoint/2010/main" val="1739469402"/>
       </p:ext>
     </p:extLst>
   </p:cSld>
@@ -8439,7 +7690,7 @@
             </a:pPr>
             <a:r>
               <a:rPr lang="en-US" dirty="0"/>
-              <a:t> Using the shortest path filtration, the 1-dimensional persistence barcode is the only non-trivial one.</a:t>
+              <a:t> The shortest path filtration lets us associate a 1-dimensional persistence barcode to every vertex. The 1-dimensional persistence barcode is the only non-trivial one.</a:t>
             </a:r>
           </a:p>
           <a:p>
@@ -8508,8 +7759,8 @@
           </a:p>
         </p:txBody>
       </p:sp>
-      <mc:AlternateContent xmlns:mc="http://schemas.openxmlformats.org/markup-compatibility/2006" xmlns:a14="http://schemas.microsoft.com/office/drawing/2010/main">
-        <mc:Choice Requires="a14">
+      <mc:AlternateContent xmlns:mc="http://schemas.openxmlformats.org/markup-compatibility/2006">
+        <mc:Choice xmlns:a14="http://schemas.microsoft.com/office/drawing/2010/main" Requires="a14">
           <p:sp>
             <p:nvSpPr>
               <p:cNvPr id="3" name="Content Placeholder 2">
@@ -8537,547 +7788,7 @@
                 </a:pPr>
                 <a:r>
                   <a:rPr lang="en-US" dirty="0"/>
-                  <a:t> Using the shortest path filtration, the 1-dimensional persistence barcode is the only non-trivial one.</a:t>
-                </a:r>
-              </a:p>
-              <a:p>
-                <a:pPr>
-                  <a:buFont typeface="Arial" panose="020B0604020202020204" pitchFamily="34" charset="0"/>
-                  <a:buChar char="•"/>
-                </a:pPr>
-                <a:r>
-                  <a:rPr lang="en-US" dirty="0"/>
-                  <a:t> The </a:t>
-                </a:r>
-                <a14:m>
-                  <m:oMath xmlns:m="http://schemas.openxmlformats.org/officeDocument/2006/math">
-                    <m:r>
-                      <a:rPr lang="en-US" b="0" i="1" smtClean="0">
-                        <a:latin typeface="Cambria Math" panose="02040503050406030204" pitchFamily="18" charset="0"/>
-                      </a:rPr>
-                      <m:t>𝑝</m:t>
-                    </m:r>
-                    <m:r>
-                      <a:rPr lang="en-US" b="0" i="1" smtClean="0">
-                        <a:latin typeface="Cambria Math" panose="02040503050406030204" pitchFamily="18" charset="0"/>
-                      </a:rPr>
-                      <m:t>,</m:t>
-                    </m:r>
-                    <m:r>
-                      <a:rPr lang="en-US" b="0" i="1" smtClean="0">
-                        <a:latin typeface="Cambria Math" panose="02040503050406030204" pitchFamily="18" charset="0"/>
-                      </a:rPr>
-                      <m:t>𝑞</m:t>
-                    </m:r>
-                  </m:oMath>
-                </a14:m>
-                <a:r>
-                  <a:rPr lang="en-US" dirty="0"/>
-                  <a:t> Wasserstein distance between two barcodes </a:t>
-                </a:r>
-                <a14:m>
-                  <m:oMath xmlns:m="http://schemas.openxmlformats.org/officeDocument/2006/math">
-                    <m:r>
-                      <a:rPr lang="en-US" b="0" i="1" smtClean="0">
-                        <a:latin typeface="Cambria Math" panose="02040503050406030204" pitchFamily="18" charset="0"/>
-                      </a:rPr>
-                      <m:t>𝐴</m:t>
-                    </m:r>
-                  </m:oMath>
-                </a14:m>
-                <a:r>
-                  <a:rPr lang="en-US" dirty="0"/>
-                  <a:t> and </a:t>
-                </a:r>
-                <a14:m>
-                  <m:oMath xmlns:m="http://schemas.openxmlformats.org/officeDocument/2006/math">
-                    <m:r>
-                      <a:rPr lang="en-US" b="0" i="1" smtClean="0">
-                        <a:latin typeface="Cambria Math" panose="02040503050406030204" pitchFamily="18" charset="0"/>
-                      </a:rPr>
-                      <m:t>𝐵</m:t>
-                    </m:r>
-                    <m:r>
-                      <a:rPr lang="en-US" b="0" i="1" smtClean="0">
-                        <a:latin typeface="Cambria Math" panose="02040503050406030204" pitchFamily="18" charset="0"/>
-                      </a:rPr>
-                      <m:t> </m:t>
-                    </m:r>
-                  </m:oMath>
-                </a14:m>
-                <a:r>
-                  <a:rPr lang="en-US" dirty="0"/>
-                  <a:t>is given by</a:t>
-                </a:r>
-              </a:p>
-              <a:p>
-                <a:pPr marL="0" indent="0" algn="ctr">
-                  <a:buNone/>
-                </a:pPr>
-                <a14:m>
-                  <m:oMathPara xmlns:m="http://schemas.openxmlformats.org/officeDocument/2006/math">
-                    <m:oMathParaPr>
-                      <m:jc m:val="centerGroup"/>
-                    </m:oMathParaPr>
-                    <m:oMath xmlns:m="http://schemas.openxmlformats.org/officeDocument/2006/math">
-                      <m:sSub>
-                        <m:sSubPr>
-                          <m:ctrlPr>
-                            <a:rPr lang="en-US" b="0" i="1" smtClean="0">
-                              <a:latin typeface="Cambria Math" panose="02040503050406030204" pitchFamily="18" charset="0"/>
-                            </a:rPr>
-                          </m:ctrlPr>
-                        </m:sSubPr>
-                        <m:e>
-                          <m:r>
-                            <a:rPr lang="en-US" b="0" i="1" smtClean="0">
-                              <a:latin typeface="Cambria Math" panose="02040503050406030204" pitchFamily="18" charset="0"/>
-                            </a:rPr>
-                            <m:t>𝑊</m:t>
-                          </m:r>
-                        </m:e>
-                        <m:sub>
-                          <m:r>
-                            <a:rPr lang="en-US" b="0" i="1" smtClean="0">
-                              <a:latin typeface="Cambria Math" panose="02040503050406030204" pitchFamily="18" charset="0"/>
-                            </a:rPr>
-                            <m:t>𝑝</m:t>
-                          </m:r>
-                          <m:r>
-                            <a:rPr lang="en-US" b="0" i="1" smtClean="0">
-                              <a:latin typeface="Cambria Math" panose="02040503050406030204" pitchFamily="18" charset="0"/>
-                            </a:rPr>
-                            <m:t>,</m:t>
-                          </m:r>
-                          <m:r>
-                            <a:rPr lang="en-US" b="0" i="1" smtClean="0">
-                              <a:latin typeface="Cambria Math" panose="02040503050406030204" pitchFamily="18" charset="0"/>
-                            </a:rPr>
-                            <m:t>𝑞</m:t>
-                          </m:r>
-                        </m:sub>
-                      </m:sSub>
-                      <m:d>
-                        <m:dPr>
-                          <m:ctrlPr>
-                            <a:rPr lang="en-US" b="0" i="1" smtClean="0">
-                              <a:latin typeface="Cambria Math" panose="02040503050406030204" pitchFamily="18" charset="0"/>
-                            </a:rPr>
-                          </m:ctrlPr>
-                        </m:dPr>
-                        <m:e>
-                          <m:r>
-                            <a:rPr lang="en-US" b="0" i="1" smtClean="0">
-                              <a:latin typeface="Cambria Math" panose="02040503050406030204" pitchFamily="18" charset="0"/>
-                            </a:rPr>
-                            <m:t>𝐴</m:t>
-                          </m:r>
-                          <m:r>
-                            <a:rPr lang="en-US" b="0" i="1" smtClean="0">
-                              <a:latin typeface="Cambria Math" panose="02040503050406030204" pitchFamily="18" charset="0"/>
-                            </a:rPr>
-                            <m:t>,</m:t>
-                          </m:r>
-                          <m:r>
-                            <a:rPr lang="en-US" b="0" i="1" smtClean="0">
-                              <a:latin typeface="Cambria Math" panose="02040503050406030204" pitchFamily="18" charset="0"/>
-                            </a:rPr>
-                            <m:t>𝐵</m:t>
-                          </m:r>
-                        </m:e>
-                      </m:d>
-                      <m:r>
-                        <a:rPr lang="en-US" b="0" i="1" smtClean="0">
-                          <a:latin typeface="Cambria Math" panose="02040503050406030204" pitchFamily="18" charset="0"/>
-                        </a:rPr>
-                        <m:t>=</m:t>
-                      </m:r>
-                      <m:func>
-                        <m:funcPr>
-                          <m:ctrlPr>
-                            <a:rPr lang="en-US" b="0" i="1" smtClean="0">
-                              <a:latin typeface="Cambria Math" panose="02040503050406030204" pitchFamily="18" charset="0"/>
-                            </a:rPr>
-                          </m:ctrlPr>
-                        </m:funcPr>
-                        <m:fName>
-                          <m:limLow>
-                            <m:limLowPr>
-                              <m:ctrlPr>
-                                <a:rPr lang="en-US" b="0" i="1" smtClean="0">
-                                  <a:latin typeface="Cambria Math" panose="02040503050406030204" pitchFamily="18" charset="0"/>
-                                </a:rPr>
-                              </m:ctrlPr>
-                            </m:limLowPr>
-                            <m:e>
-                              <m:r>
-                                <m:rPr>
-                                  <m:sty m:val="p"/>
-                                </m:rPr>
-                                <a:rPr lang="en-US" b="0" i="0" smtClean="0">
-                                  <a:latin typeface="Cambria Math" panose="02040503050406030204" pitchFamily="18" charset="0"/>
-                                </a:rPr>
-                                <m:t>inf</m:t>
-                              </m:r>
-                            </m:e>
-                            <m:lim>
-                              <m:eqArr>
-                                <m:eqArrPr>
-                                  <m:ctrlPr>
-                                    <a:rPr lang="en-US" b="0" i="1" smtClean="0">
-                                      <a:latin typeface="Cambria Math" panose="02040503050406030204" pitchFamily="18" charset="0"/>
-                                    </a:rPr>
-                                  </m:ctrlPr>
-                                </m:eqArrPr>
-                                <m:e>
-                                  <m:r>
-                                    <a:rPr lang="en-US" b="0" i="1" smtClean="0">
-                                      <a:latin typeface="Cambria Math" panose="02040503050406030204" pitchFamily="18" charset="0"/>
-                                    </a:rPr>
-                                    <m:t>𝜂</m:t>
-                                  </m:r>
-                                  <m:r>
-                                    <a:rPr lang="en-US" b="0" i="1" smtClean="0">
-                                      <a:latin typeface="Cambria Math" panose="02040503050406030204" pitchFamily="18" charset="0"/>
-                                    </a:rPr>
-                                    <m:t>:</m:t>
-                                  </m:r>
-                                  <m:r>
-                                    <a:rPr lang="en-US" b="0" i="1" smtClean="0">
-                                      <a:latin typeface="Cambria Math" panose="02040503050406030204" pitchFamily="18" charset="0"/>
-                                    </a:rPr>
-                                    <m:t>𝐴</m:t>
-                                  </m:r>
-                                  <m:r>
-                                    <a:rPr lang="en-US" b="0" i="1" smtClean="0">
-                                      <a:latin typeface="Cambria Math" panose="02040503050406030204" pitchFamily="18" charset="0"/>
-                                    </a:rPr>
-                                    <m:t>→</m:t>
-                                  </m:r>
-                                  <m:r>
-                                    <a:rPr lang="en-US" b="0" i="1" smtClean="0">
-                                      <a:latin typeface="Cambria Math" panose="02040503050406030204" pitchFamily="18" charset="0"/>
-                                    </a:rPr>
-                                    <m:t>𝐵</m:t>
-                                  </m:r>
-                                </m:e>
-                                <m:e>
-                                  <m:r>
-                                    <a:rPr lang="en-US" b="0" i="1" smtClean="0">
-                                      <a:latin typeface="Cambria Math" panose="02040503050406030204" pitchFamily="18" charset="0"/>
-                                    </a:rPr>
-                                    <m:t>𝑎</m:t>
-                                  </m:r>
-                                  <m:r>
-                                    <a:rPr lang="en-US" b="0" i="1" smtClean="0">
-                                      <a:latin typeface="Cambria Math" panose="02040503050406030204" pitchFamily="18" charset="0"/>
-                                    </a:rPr>
-                                    <m:t> </m:t>
-                                  </m:r>
-                                  <m:r>
-                                    <a:rPr lang="en-US" b="0" i="1" smtClean="0">
-                                      <a:latin typeface="Cambria Math" panose="02040503050406030204" pitchFamily="18" charset="0"/>
-                                    </a:rPr>
-                                    <m:t>𝑏𝑖𝑗𝑒𝑐𝑡𝑖𝑜𝑛</m:t>
-                                  </m:r>
-                                </m:e>
-                              </m:eqArr>
-                            </m:lim>
-                          </m:limLow>
-                        </m:fName>
-                        <m:e>
-                          <m:sSup>
-                            <m:sSupPr>
-                              <m:ctrlPr>
-                                <a:rPr lang="en-US" b="0" i="1" smtClean="0">
-                                  <a:latin typeface="Cambria Math" panose="02040503050406030204" pitchFamily="18" charset="0"/>
-                                </a:rPr>
-                              </m:ctrlPr>
-                            </m:sSupPr>
-                            <m:e>
-                              <m:d>
-                                <m:dPr>
-                                  <m:ctrlPr>
-                                    <a:rPr lang="en-US" b="0" i="1" smtClean="0">
-                                      <a:latin typeface="Cambria Math" panose="02040503050406030204" pitchFamily="18" charset="0"/>
-                                    </a:rPr>
-                                  </m:ctrlPr>
-                                </m:dPr>
-                                <m:e>
-                                  <m:nary>
-                                    <m:naryPr>
-                                      <m:chr m:val="∑"/>
-                                      <m:supHide m:val="on"/>
-                                      <m:ctrlPr>
-                                        <a:rPr lang="en-US" b="0" i="1" smtClean="0">
-                                          <a:latin typeface="Cambria Math" panose="02040503050406030204" pitchFamily="18" charset="0"/>
-                                        </a:rPr>
-                                      </m:ctrlPr>
-                                    </m:naryPr>
-                                    <m:sub>
-                                      <m:r>
-                                        <m:rPr>
-                                          <m:brk m:alnAt="7"/>
-                                        </m:rPr>
-                                        <a:rPr lang="en-US" b="0" i="1" smtClean="0">
-                                          <a:latin typeface="Cambria Math" panose="02040503050406030204" pitchFamily="18" charset="0"/>
-                                        </a:rPr>
-                                        <m:t>𝑎</m:t>
-                                      </m:r>
-                                      <m:r>
-                                        <a:rPr lang="en-US" b="0" i="1" smtClean="0">
-                                          <a:latin typeface="Cambria Math" panose="02040503050406030204" pitchFamily="18" charset="0"/>
-                                        </a:rPr>
-                                        <m:t>∈</m:t>
-                                      </m:r>
-                                      <m:r>
-                                        <a:rPr lang="en-US" b="0" i="1" smtClean="0">
-                                          <a:latin typeface="Cambria Math" panose="02040503050406030204" pitchFamily="18" charset="0"/>
-                                        </a:rPr>
-                                        <m:t>𝐴</m:t>
-                                      </m:r>
-                                    </m:sub>
-                                    <m:sup/>
-                                    <m:e>
-                                      <m:sSubSup>
-                                        <m:sSubSupPr>
-                                          <m:ctrlPr>
-                                            <a:rPr lang="en-US" b="0" i="1" smtClean="0">
-                                              <a:latin typeface="Cambria Math" panose="02040503050406030204" pitchFamily="18" charset="0"/>
-                                            </a:rPr>
-                                          </m:ctrlPr>
-                                        </m:sSubSupPr>
-                                        <m:e>
-                                          <m:d>
-                                            <m:dPr>
-                                              <m:begChr m:val="‖"/>
-                                              <m:endChr m:val="‖"/>
-                                              <m:ctrlPr>
-                                                <a:rPr lang="en-US" b="0" i="1" smtClean="0">
-                                                  <a:latin typeface="Cambria Math" panose="02040503050406030204" pitchFamily="18" charset="0"/>
-                                                </a:rPr>
-                                              </m:ctrlPr>
-                                            </m:dPr>
-                                            <m:e>
-                                              <m:r>
-                                                <a:rPr lang="en-US" b="0" i="1" smtClean="0">
-                                                  <a:latin typeface="Cambria Math" panose="02040503050406030204" pitchFamily="18" charset="0"/>
-                                                </a:rPr>
-                                                <m:t>𝑎</m:t>
-                                              </m:r>
-                                              <m:r>
-                                                <a:rPr lang="en-US" b="0" i="1" smtClean="0">
-                                                  <a:latin typeface="Cambria Math" panose="02040503050406030204" pitchFamily="18" charset="0"/>
-                                                </a:rPr>
-                                                <m:t>−</m:t>
-                                              </m:r>
-                                              <m:r>
-                                                <a:rPr lang="en-US" b="0" i="1" smtClean="0">
-                                                  <a:latin typeface="Cambria Math" panose="02040503050406030204" pitchFamily="18" charset="0"/>
-                                                </a:rPr>
-                                                <m:t>𝜂</m:t>
-                                              </m:r>
-                                              <m:d>
-                                                <m:dPr>
-                                                  <m:ctrlPr>
-                                                    <a:rPr lang="en-US" b="0" i="1" smtClean="0">
-                                                      <a:latin typeface="Cambria Math" panose="02040503050406030204" pitchFamily="18" charset="0"/>
-                                                    </a:rPr>
-                                                  </m:ctrlPr>
-                                                </m:dPr>
-                                                <m:e>
-                                                  <m:r>
-                                                    <a:rPr lang="en-US" b="0" i="1" smtClean="0">
-                                                      <a:latin typeface="Cambria Math" panose="02040503050406030204" pitchFamily="18" charset="0"/>
-                                                    </a:rPr>
-                                                    <m:t>𝑎</m:t>
-                                                  </m:r>
-                                                </m:e>
-                                              </m:d>
-                                            </m:e>
-                                          </m:d>
-                                        </m:e>
-                                        <m:sub>
-                                          <m:r>
-                                            <a:rPr lang="en-US" b="0" i="1" smtClean="0">
-                                              <a:latin typeface="Cambria Math" panose="02040503050406030204" pitchFamily="18" charset="0"/>
-                                            </a:rPr>
-                                            <m:t>𝑞</m:t>
-                                          </m:r>
-                                        </m:sub>
-                                        <m:sup>
-                                          <m:r>
-                                            <a:rPr lang="en-US" b="0" i="1" smtClean="0">
-                                              <a:latin typeface="Cambria Math" panose="02040503050406030204" pitchFamily="18" charset="0"/>
-                                            </a:rPr>
-                                            <m:t>𝑝</m:t>
-                                          </m:r>
-                                        </m:sup>
-                                      </m:sSubSup>
-                                    </m:e>
-                                  </m:nary>
-                                </m:e>
-                              </m:d>
-                            </m:e>
-                            <m:sup>
-                              <m:r>
-                                <a:rPr lang="en-US" b="0" i="1" smtClean="0">
-                                  <a:latin typeface="Cambria Math" panose="02040503050406030204" pitchFamily="18" charset="0"/>
-                                </a:rPr>
-                                <m:t>1/</m:t>
-                              </m:r>
-                              <m:r>
-                                <a:rPr lang="en-US" b="0" i="1" smtClean="0">
-                                  <a:latin typeface="Cambria Math" panose="02040503050406030204" pitchFamily="18" charset="0"/>
-                                </a:rPr>
-                                <m:t>𝑝</m:t>
-                              </m:r>
-                            </m:sup>
-                          </m:sSup>
-                        </m:e>
-                      </m:func>
-                    </m:oMath>
-                  </m:oMathPara>
-                </a14:m>
-                <a:endParaRPr lang="en-US" dirty="0"/>
-              </a:p>
-              <a:p>
-                <a:pPr marL="0" indent="0">
-                  <a:buNone/>
-                </a:pPr>
-                <a:endParaRPr lang="en-US" dirty="0"/>
-              </a:p>
-            </p:txBody>
-          </p:sp>
-        </mc:Choice>
-        <mc:Fallback xmlns="">
-          <p:sp>
-            <p:nvSpPr>
-              <p:cNvPr id="3" name="Content Placeholder 2">
-                <a:extLst>
-                  <a:ext uri="{FF2B5EF4-FFF2-40B4-BE49-F238E27FC236}">
-                    <a16:creationId xmlns:a16="http://schemas.microsoft.com/office/drawing/2014/main" id="{CCED2568-23B7-4940-8C9D-8DBFB2F94A2E}"/>
-                  </a:ext>
-                </a:extLst>
-              </p:cNvPr>
-              <p:cNvSpPr>
-                <a:spLocks noGrp="1" noRot="1" noChangeAspect="1" noMove="1" noResize="1" noEditPoints="1" noAdjustHandles="1" noChangeArrowheads="1" noChangeShapeType="1" noTextEdit="1"/>
-              </p:cNvSpPr>
-              <p:nvPr>
-                <p:ph idx="1"/>
-              </p:nvPr>
-            </p:nvSpPr>
-            <p:spPr>
-              <a:blipFill>
-                <a:blip r:embed="rId2"/>
-                <a:stretch>
-                  <a:fillRect l="-1455" t="-1667" r="-303"/>
-                </a:stretch>
-              </a:blipFill>
-            </p:spPr>
-            <p:txBody>
-              <a:bodyPr/>
-              <a:lstStyle/>
-              <a:p>
-                <a:r>
-                  <a:rPr lang="en-US">
-                    <a:noFill/>
-                  </a:rPr>
-                  <a:t> </a:t>
-                </a:r>
-              </a:p>
-            </p:txBody>
-          </p:sp>
-        </mc:Fallback>
-      </mc:AlternateContent>
-    </p:spTree>
-    <p:extLst>
-      <p:ext uri="{BB962C8B-B14F-4D97-AF65-F5344CB8AC3E}">
-        <p14:creationId xmlns:p14="http://schemas.microsoft.com/office/powerpoint/2010/main" val="135258604"/>
-      </p:ext>
-    </p:extLst>
-  </p:cSld>
-  <p:clrMapOvr>
-    <a:masterClrMapping/>
-  </p:clrMapOvr>
-</p:sld>
-</file>
-
-<file path=ppt/slides/slide9.xml><?xml version="1.0" encoding="utf-8"?>
-<p:sld xmlns:a="http://schemas.openxmlformats.org/drawingml/2006/main" xmlns:r="http://schemas.openxmlformats.org/officeDocument/2006/relationships" xmlns:p="http://schemas.openxmlformats.org/presentationml/2006/main">
-  <p:cSld>
-    <p:spTree>
-      <p:nvGrpSpPr>
-        <p:cNvPr id="1" name=""/>
-        <p:cNvGrpSpPr/>
-        <p:nvPr/>
-      </p:nvGrpSpPr>
-      <p:grpSpPr>
-        <a:xfrm>
-          <a:off x="0" y="0"/>
-          <a:ext cx="0" cy="0"/>
-          <a:chOff x="0" y="0"/>
-          <a:chExt cx="0" cy="0"/>
-        </a:xfrm>
-      </p:grpSpPr>
-      <p:sp>
-        <p:nvSpPr>
-          <p:cNvPr id="2" name="Title 1">
-            <a:extLst>
-              <a:ext uri="{FF2B5EF4-FFF2-40B4-BE49-F238E27FC236}">
-                <a16:creationId xmlns:a16="http://schemas.microsoft.com/office/drawing/2014/main" id="{A5ACEB1B-D2E9-47B0-9E2B-47B119F2DB5B}"/>
-              </a:ext>
-            </a:extLst>
-          </p:cNvPr>
-          <p:cNvSpPr>
-            <a:spLocks noGrp="1"/>
-          </p:cNvSpPr>
-          <p:nvPr>
-            <p:ph type="title"/>
-          </p:nvPr>
-        </p:nvSpPr>
-        <p:spPr/>
-        <p:txBody>
-          <a:bodyPr/>
-          <a:lstStyle/>
-          <a:p>
-            <a:r>
-              <a:rPr lang="en-US" dirty="0"/>
-              <a:t>Persistence Barcodes and the Wasserstein Distance</a:t>
-            </a:r>
-          </a:p>
-        </p:txBody>
-      </p:sp>
-      <mc:AlternateContent xmlns:mc="http://schemas.openxmlformats.org/markup-compatibility/2006" xmlns:a14="http://schemas.microsoft.com/office/drawing/2010/main">
-        <mc:Choice Requires="a14">
-          <p:sp>
-            <p:nvSpPr>
-              <p:cNvPr id="3" name="Content Placeholder 2">
-                <a:extLst>
-                  <a:ext uri="{FF2B5EF4-FFF2-40B4-BE49-F238E27FC236}">
-                    <a16:creationId xmlns:a16="http://schemas.microsoft.com/office/drawing/2014/main" id="{CCED2568-23B7-4940-8C9D-8DBFB2F94A2E}"/>
-                  </a:ext>
-                </a:extLst>
-              </p:cNvPr>
-              <p:cNvSpPr>
-                <a:spLocks noGrp="1"/>
-              </p:cNvSpPr>
-              <p:nvPr>
-                <p:ph idx="1"/>
-              </p:nvPr>
-            </p:nvSpPr>
-            <p:spPr/>
-            <p:txBody>
-              <a:bodyPr/>
-              <a:lstStyle/>
-              <a:p>
-                <a:pPr>
-                  <a:buFont typeface="Arial" panose="020B0604020202020204" pitchFamily="34" charset="0"/>
-                  <a:buChar char="•"/>
-                </a:pPr>
-                <a:r>
-                  <a:rPr lang="en-US" dirty="0"/>
-                  <a:t> Using the shortest path filtration, the 1-dimensional persistence barcode is the only non-trivial one.</a:t>
+                  <a:t> The shortest path filtration lets us associate a 1-dimensional persistence barcode to every vertex. The 1-dimensional persistence barcode is the only non-trivial one.</a:t>
                 </a:r>
               </a:p>
               <a:p>
@@ -9497,7 +8208,7 @@
             </p:txBody>
           </p:sp>
         </mc:Choice>
-        <mc:Fallback xmlns="">
+        <mc:Fallback>
           <p:sp>
             <p:nvSpPr>
               <p:cNvPr id="3" name="Content Placeholder 2">
@@ -9541,6 +8252,231 @@
     <p:extLst>
       <p:ext uri="{BB962C8B-B14F-4D97-AF65-F5344CB8AC3E}">
         <p14:creationId xmlns:p14="http://schemas.microsoft.com/office/powerpoint/2010/main" val="284014104"/>
+      </p:ext>
+    </p:extLst>
+  </p:cSld>
+  <p:clrMapOvr>
+    <a:masterClrMapping/>
+  </p:clrMapOvr>
+</p:sld>
+</file>
+
+<file path=ppt/slides/slide9.xml><?xml version="1.0" encoding="utf-8"?>
+<p:sld xmlns:a="http://schemas.openxmlformats.org/drawingml/2006/main" xmlns:r="http://schemas.openxmlformats.org/officeDocument/2006/relationships" xmlns:p="http://schemas.openxmlformats.org/presentationml/2006/main">
+  <p:cSld>
+    <p:spTree>
+      <p:nvGrpSpPr>
+        <p:cNvPr id="1" name=""/>
+        <p:cNvGrpSpPr/>
+        <p:nvPr/>
+      </p:nvGrpSpPr>
+      <p:grpSpPr>
+        <a:xfrm>
+          <a:off x="0" y="0"/>
+          <a:ext cx="0" cy="0"/>
+          <a:chOff x="0" y="0"/>
+          <a:chExt cx="0" cy="0"/>
+        </a:xfrm>
+      </p:grpSpPr>
+      <p:sp>
+        <p:nvSpPr>
+          <p:cNvPr id="2" name="Title 1">
+            <a:extLst>
+              <a:ext uri="{FF2B5EF4-FFF2-40B4-BE49-F238E27FC236}">
+                <a16:creationId xmlns:a16="http://schemas.microsoft.com/office/drawing/2014/main" id="{7469C244-433B-45FB-B3EA-914CB98F046F}"/>
+              </a:ext>
+            </a:extLst>
+          </p:cNvPr>
+          <p:cNvSpPr>
+            <a:spLocks noGrp="1"/>
+          </p:cNvSpPr>
+          <p:nvPr>
+            <p:ph type="title"/>
+          </p:nvPr>
+        </p:nvSpPr>
+        <p:spPr/>
+        <p:txBody>
+          <a:bodyPr/>
+          <a:lstStyle/>
+          <a:p>
+            <a:r>
+              <a:rPr lang="en-US" dirty="0"/>
+              <a:t>Advantages of the Shortest Path Filtration</a:t>
+            </a:r>
+          </a:p>
+        </p:txBody>
+      </p:sp>
+      <mc:AlternateContent xmlns:mc="http://schemas.openxmlformats.org/markup-compatibility/2006">
+        <mc:Choice xmlns:a14="http://schemas.microsoft.com/office/drawing/2010/main" Requires="a14">
+          <p:sp>
+            <p:nvSpPr>
+              <p:cNvPr id="3" name="Content Placeholder 2">
+                <a:extLst>
+                  <a:ext uri="{FF2B5EF4-FFF2-40B4-BE49-F238E27FC236}">
+                    <a16:creationId xmlns:a16="http://schemas.microsoft.com/office/drawing/2014/main" id="{4930F31C-7A98-4E2D-A115-949BF5EFE58B}"/>
+                  </a:ext>
+                </a:extLst>
+              </p:cNvPr>
+              <p:cNvSpPr>
+                <a:spLocks noGrp="1"/>
+              </p:cNvSpPr>
+              <p:nvPr>
+                <p:ph idx="1"/>
+              </p:nvPr>
+            </p:nvSpPr>
+            <p:spPr>
+              <a:xfrm>
+                <a:off x="763481" y="1845734"/>
+                <a:ext cx="10392200" cy="4404146"/>
+              </a:xfrm>
+            </p:spPr>
+            <p:txBody>
+              <a:bodyPr>
+                <a:normAutofit/>
+              </a:bodyPr>
+              <a:lstStyle/>
+              <a:p>
+                <a:pPr>
+                  <a:buFont typeface="Arial" panose="020B0604020202020204" pitchFamily="34" charset="0"/>
+                  <a:buChar char="•"/>
+                </a:pPr>
+                <a:r>
+                  <a:rPr lang="en-US" dirty="0"/>
+                  <a:t> Because the shortest path filtration is 1-dimensional, the 1-cycle death times will all be infinite. We can model the persistence barcodes as </a:t>
+                </a:r>
+                <a14:m>
+                  <m:oMath xmlns:m="http://schemas.openxmlformats.org/officeDocument/2006/math">
+                    <m:r>
+                      <a:rPr lang="en-US" b="0" i="1" smtClean="0">
+                        <a:latin typeface="Cambria Math" panose="02040503050406030204" pitchFamily="18" charset="0"/>
+                      </a:rPr>
+                      <m:t>𝑙</m:t>
+                    </m:r>
+                    <m:r>
+                      <a:rPr lang="en-US" b="0" i="1" smtClean="0">
+                        <a:latin typeface="Cambria Math" panose="02040503050406030204" pitchFamily="18" charset="0"/>
+                      </a:rPr>
+                      <m:t>×2</m:t>
+                    </m:r>
+                  </m:oMath>
+                </a14:m>
+                <a:r>
+                  <a:rPr lang="en-US" dirty="0"/>
+                  <a:t> matrices where </a:t>
+                </a:r>
+                <a14:m>
+                  <m:oMath xmlns:m="http://schemas.openxmlformats.org/officeDocument/2006/math">
+                    <m:r>
+                      <a:rPr lang="en-US" b="0" i="1" smtClean="0">
+                        <a:latin typeface="Cambria Math" panose="02040503050406030204" pitchFamily="18" charset="0"/>
+                      </a:rPr>
+                      <m:t>𝑙</m:t>
+                    </m:r>
+                  </m:oMath>
+                </a14:m>
+                <a:r>
+                  <a:rPr lang="en-US" dirty="0"/>
+                  <a:t> is the total number of </a:t>
+                </a:r>
+                <a14:m>
+                  <m:oMath xmlns:m="http://schemas.openxmlformats.org/officeDocument/2006/math">
+                    <m:r>
+                      <a:rPr lang="en-US" b="0" i="1" smtClean="0">
+                        <a:latin typeface="Cambria Math" panose="02040503050406030204" pitchFamily="18" charset="0"/>
+                      </a:rPr>
+                      <m:t>1</m:t>
+                    </m:r>
+                  </m:oMath>
+                </a14:m>
+                <a:r>
+                  <a:rPr lang="en-US" dirty="0"/>
+                  <a:t>-cycles in </a:t>
+                </a:r>
+                <a14:m>
+                  <m:oMath xmlns:m="http://schemas.openxmlformats.org/officeDocument/2006/math">
+                    <m:r>
+                      <a:rPr lang="en-US" b="0" i="1" smtClean="0">
+                        <a:latin typeface="Cambria Math" panose="02040503050406030204" pitchFamily="18" charset="0"/>
+                      </a:rPr>
+                      <m:t>𝑋</m:t>
+                    </m:r>
+                  </m:oMath>
+                </a14:m>
+                <a:r>
+                  <a:rPr lang="en-US" dirty="0"/>
+                  <a:t>.</a:t>
+                </a:r>
+              </a:p>
+              <a:p>
+                <a:pPr marL="0" indent="0">
+                  <a:buNone/>
+                </a:pPr>
+                <a:endParaRPr lang="en-US" dirty="0"/>
+              </a:p>
+              <a:p>
+                <a:pPr marL="0" indent="0">
+                  <a:buNone/>
+                </a:pPr>
+                <a:endParaRPr lang="en-US" dirty="0"/>
+              </a:p>
+              <a:p>
+                <a:pPr>
+                  <a:buFont typeface="Arial" panose="020B0604020202020204" pitchFamily="34" charset="0"/>
+                  <a:buChar char="•"/>
+                </a:pPr>
+                <a:endParaRPr lang="en-US" dirty="0"/>
+              </a:p>
+            </p:txBody>
+          </p:sp>
+        </mc:Choice>
+        <mc:Fallback>
+          <p:sp>
+            <p:nvSpPr>
+              <p:cNvPr id="3" name="Content Placeholder 2">
+                <a:extLst>
+                  <a:ext uri="{FF2B5EF4-FFF2-40B4-BE49-F238E27FC236}">
+                    <a16:creationId xmlns:a16="http://schemas.microsoft.com/office/drawing/2014/main" id="{4930F31C-7A98-4E2D-A115-949BF5EFE58B}"/>
+                  </a:ext>
+                </a:extLst>
+              </p:cNvPr>
+              <p:cNvSpPr>
+                <a:spLocks noGrp="1" noRot="1" noChangeAspect="1" noMove="1" noResize="1" noEditPoints="1" noAdjustHandles="1" noChangeArrowheads="1" noChangeShapeType="1" noTextEdit="1"/>
+              </p:cNvSpPr>
+              <p:nvPr>
+                <p:ph idx="1"/>
+              </p:nvPr>
+            </p:nvSpPr>
+            <p:spPr>
+              <a:xfrm>
+                <a:off x="763481" y="1845734"/>
+                <a:ext cx="10392200" cy="4404146"/>
+              </a:xfrm>
+              <a:blipFill>
+                <a:blip r:embed="rId2"/>
+                <a:stretch>
+                  <a:fillRect l="-1408" t="-1524" r="-1584"/>
+                </a:stretch>
+              </a:blipFill>
+            </p:spPr>
+            <p:txBody>
+              <a:bodyPr/>
+              <a:lstStyle/>
+              <a:p>
+                <a:r>
+                  <a:rPr lang="en-US">
+                    <a:noFill/>
+                  </a:rPr>
+                  <a:t> </a:t>
+                </a:r>
+              </a:p>
+            </p:txBody>
+          </p:sp>
+        </mc:Fallback>
+      </mc:AlternateContent>
+    </p:spTree>
+    <p:extLst>
+      <p:ext uri="{BB962C8B-B14F-4D97-AF65-F5344CB8AC3E}">
+        <p14:creationId xmlns:p14="http://schemas.microsoft.com/office/powerpoint/2010/main" val="2855777966"/>
       </p:ext>
     </p:extLst>
   </p:cSld>

</xml_diff>